<commit_message>
dropped some old slides + updated animations
</commit_message>
<xml_diff>
--- a/alternative slides.pptx
+++ b/alternative slides.pptx
@@ -5,15 +5,13 @@
     <p:sldMasterId id="2147483648" r:id="rId1"/>
   </p:sldMasterIdLst>
   <p:notesMasterIdLst>
-    <p:notesMasterId r:id="rId8"/>
+    <p:notesMasterId r:id="rId6"/>
   </p:notesMasterIdLst>
   <p:sldIdLst>
-    <p:sldId id="264" r:id="rId2"/>
-    <p:sldId id="273" r:id="rId3"/>
-    <p:sldId id="298" r:id="rId4"/>
-    <p:sldId id="296" r:id="rId5"/>
-    <p:sldId id="297" r:id="rId6"/>
-    <p:sldId id="299" r:id="rId7"/>
+    <p:sldId id="298" r:id="rId2"/>
+    <p:sldId id="296" r:id="rId3"/>
+    <p:sldId id="297" r:id="rId4"/>
+    <p:sldId id="299" r:id="rId5"/>
   </p:sldIdLst>
   <p:sldSz cx="12192000" cy="6858000"/>
   <p:notesSz cx="6858000" cy="9144000"/>
@@ -202,7 +200,7 @@
           <a:p>
             <a:fld id="{A56D39D0-7AD6-4DED-BA32-F76B7FD879CC}" type="datetimeFigureOut">
               <a:rPr lang="fr-FR" smtClean="0"/>
-              <a:t>22/09/2022</a:t>
+              <a:t>24/09/2022</a:t>
             </a:fld>
             <a:endParaRPr lang="fr-FR"/>
           </a:p>
@@ -616,7 +614,7 @@
           <a:p>
             <a:fld id="{1A69C899-BD2C-4FFA-B951-D99F6848B9E7}" type="datetimeFigureOut">
               <a:rPr lang="fr-FR" smtClean="0"/>
-              <a:t>22/09/2022</a:t>
+              <a:t>24/09/2022</a:t>
             </a:fld>
             <a:endParaRPr lang="fr-FR"/>
           </a:p>
@@ -814,7 +812,7 @@
           <a:p>
             <a:fld id="{1A69C899-BD2C-4FFA-B951-D99F6848B9E7}" type="datetimeFigureOut">
               <a:rPr lang="fr-FR" smtClean="0"/>
-              <a:t>22/09/2022</a:t>
+              <a:t>24/09/2022</a:t>
             </a:fld>
             <a:endParaRPr lang="fr-FR"/>
           </a:p>
@@ -1022,7 +1020,7 @@
           <a:p>
             <a:fld id="{1A69C899-BD2C-4FFA-B951-D99F6848B9E7}" type="datetimeFigureOut">
               <a:rPr lang="fr-FR" smtClean="0"/>
-              <a:t>22/09/2022</a:t>
+              <a:t>24/09/2022</a:t>
             </a:fld>
             <a:endParaRPr lang="fr-FR"/>
           </a:p>
@@ -1220,7 +1218,7 @@
           <a:p>
             <a:fld id="{1A69C899-BD2C-4FFA-B951-D99F6848B9E7}" type="datetimeFigureOut">
               <a:rPr lang="fr-FR" smtClean="0"/>
-              <a:t>22/09/2022</a:t>
+              <a:t>24/09/2022</a:t>
             </a:fld>
             <a:endParaRPr lang="fr-FR"/>
           </a:p>
@@ -1495,7 +1493,7 @@
           <a:p>
             <a:fld id="{1A69C899-BD2C-4FFA-B951-D99F6848B9E7}" type="datetimeFigureOut">
               <a:rPr lang="fr-FR" smtClean="0"/>
-              <a:t>22/09/2022</a:t>
+              <a:t>24/09/2022</a:t>
             </a:fld>
             <a:endParaRPr lang="fr-FR"/>
           </a:p>
@@ -1760,7 +1758,7 @@
           <a:p>
             <a:fld id="{1A69C899-BD2C-4FFA-B951-D99F6848B9E7}" type="datetimeFigureOut">
               <a:rPr lang="fr-FR" smtClean="0"/>
-              <a:t>22/09/2022</a:t>
+              <a:t>24/09/2022</a:t>
             </a:fld>
             <a:endParaRPr lang="fr-FR"/>
           </a:p>
@@ -2172,7 +2170,7 @@
           <a:p>
             <a:fld id="{1A69C899-BD2C-4FFA-B951-D99F6848B9E7}" type="datetimeFigureOut">
               <a:rPr lang="fr-FR" smtClean="0"/>
-              <a:t>22/09/2022</a:t>
+              <a:t>24/09/2022</a:t>
             </a:fld>
             <a:endParaRPr lang="fr-FR"/>
           </a:p>
@@ -2313,7 +2311,7 @@
           <a:p>
             <a:fld id="{1A69C899-BD2C-4FFA-B951-D99F6848B9E7}" type="datetimeFigureOut">
               <a:rPr lang="fr-FR" smtClean="0"/>
-              <a:t>22/09/2022</a:t>
+              <a:t>24/09/2022</a:t>
             </a:fld>
             <a:endParaRPr lang="fr-FR"/>
           </a:p>
@@ -2426,7 +2424,7 @@
           <a:p>
             <a:fld id="{1A69C899-BD2C-4FFA-B951-D99F6848B9E7}" type="datetimeFigureOut">
               <a:rPr lang="fr-FR" smtClean="0"/>
-              <a:t>22/09/2022</a:t>
+              <a:t>24/09/2022</a:t>
             </a:fld>
             <a:endParaRPr lang="fr-FR"/>
           </a:p>
@@ -2737,7 +2735,7 @@
           <a:p>
             <a:fld id="{1A69C899-BD2C-4FFA-B951-D99F6848B9E7}" type="datetimeFigureOut">
               <a:rPr lang="fr-FR" smtClean="0"/>
-              <a:t>22/09/2022</a:t>
+              <a:t>24/09/2022</a:t>
             </a:fld>
             <a:endParaRPr lang="fr-FR"/>
           </a:p>
@@ -3025,7 +3023,7 @@
           <a:p>
             <a:fld id="{1A69C899-BD2C-4FFA-B951-D99F6848B9E7}" type="datetimeFigureOut">
               <a:rPr lang="fr-FR" smtClean="0"/>
-              <a:t>22/09/2022</a:t>
+              <a:t>24/09/2022</a:t>
             </a:fld>
             <a:endParaRPr lang="fr-FR"/>
           </a:p>
@@ -3266,7 +3264,7 @@
           <a:p>
             <a:fld id="{1A69C899-BD2C-4FFA-B951-D99F6848B9E7}" type="datetimeFigureOut">
               <a:rPr lang="fr-FR" smtClean="0"/>
-              <a:t>22/09/2022</a:t>
+              <a:t>24/09/2022</a:t>
             </a:fld>
             <a:endParaRPr lang="fr-FR"/>
           </a:p>
@@ -3667,7 +3665,7 @@
 </file>
 
 <file path=ppt/slides/slide1.xml><?xml version="1.0" encoding="utf-8"?>
-<p:sld xmlns:a="http://schemas.openxmlformats.org/drawingml/2006/main" xmlns:r="http://schemas.openxmlformats.org/officeDocument/2006/relationships" xmlns:p="http://schemas.openxmlformats.org/presentationml/2006/main" show="0">
+<p:sld xmlns:a="http://schemas.openxmlformats.org/drawingml/2006/main" xmlns:r="http://schemas.openxmlformats.org/officeDocument/2006/relationships" xmlns:p="http://schemas.openxmlformats.org/presentationml/2006/main">
   <p:cSld>
     <p:spTree>
       <p:nvGrpSpPr>
@@ -3866,7 +3864,7 @@
     </p:spTree>
     <p:extLst>
       <p:ext uri="{BB962C8B-B14F-4D97-AF65-F5344CB8AC3E}">
-        <p14:creationId xmlns:p14="http://schemas.microsoft.com/office/powerpoint/2010/main" val="2544576625"/>
+        <p14:creationId xmlns:p14="http://schemas.microsoft.com/office/powerpoint/2010/main" val="2897831147"/>
       </p:ext>
     </p:extLst>
   </p:cSld>
@@ -3910,7 +3908,7 @@
                                         </p:attrNameLst>
                                       </p:cBhvr>
                                       <p:to>
-                                        <a:srgbClr val="F4EE00"/>
+                                        <a:srgbClr val="00CC00"/>
                                       </p:to>
                                     </p:animClr>
                                   </p:childTnLst>
@@ -3951,7 +3949,7 @@
                                         </p:attrNameLst>
                                       </p:cBhvr>
                                       <p:to>
-                                        <a:schemeClr val="accent2"/>
+                                        <a:srgbClr val="F0EA00"/>
                                       </p:to>
                                     </p:animClr>
                                   </p:childTnLst>
@@ -3992,7 +3990,7 @@
                                         </p:attrNameLst>
                                       </p:cBhvr>
                                       <p:to>
-                                        <a:srgbClr val="FF0000"/>
+                                        <a:schemeClr val="accent2"/>
                                       </p:to>
                                     </p:animClr>
                                   </p:childTnLst>
@@ -4035,7 +4033,7 @@
 </file>
 
 <file path=ppt/slides/slide2.xml><?xml version="1.0" encoding="utf-8"?>
-<p:sld xmlns:a="http://schemas.openxmlformats.org/drawingml/2006/main" xmlns:r="http://schemas.openxmlformats.org/officeDocument/2006/relationships" xmlns:p="http://schemas.openxmlformats.org/presentationml/2006/main" show="0">
+<p:sld xmlns:a="http://schemas.openxmlformats.org/drawingml/2006/main" xmlns:r="http://schemas.openxmlformats.org/officeDocument/2006/relationships" xmlns:p="http://schemas.openxmlformats.org/presentationml/2006/main">
   <p:cSld>
     <p:spTree>
       <p:nvGrpSpPr>
@@ -4079,7 +4077,7 @@
         <p:spPr>
           <a:xfrm>
             <a:off x="0" y="0"/>
-            <a:ext cx="12191999" cy="6858000"/>
+            <a:ext cx="12191999" cy="6857999"/>
           </a:xfrm>
           <a:prstGeom prst="rect">
             <a:avLst/>
@@ -4136,15 +4134,20 @@
           <p:nvPr/>
         </p:nvPicPr>
         <p:blipFill>
-          <a:blip r:embed="rId4"/>
-          <a:stretch>
-            <a:fillRect/>
-          </a:stretch>
+          <a:blip r:embed="rId4">
+            <a:extLst>
+              <a:ext uri="{28A0092B-C50C-407E-A947-70E740481C1C}">
+                <a14:useLocalDpi xmlns:a14="http://schemas.microsoft.com/office/drawing/2010/main" val="0"/>
+              </a:ext>
+            </a:extLst>
+          </a:blip>
+          <a:srcRect/>
+          <a:stretch/>
         </p:blipFill>
         <p:spPr>
           <a:xfrm rot="16520495">
             <a:off x="715012" y="497138"/>
-            <a:ext cx="1402950" cy="1352443"/>
+            <a:ext cx="1402949" cy="1352443"/>
           </a:xfrm>
           <a:prstGeom prst="rect">
             <a:avLst/>
@@ -4167,7 +4170,7 @@
         </p:nvCxnSpPr>
         <p:spPr>
           <a:xfrm rot="17163022" flipH="1">
-            <a:off x="1536961" y="1650952"/>
+            <a:off x="1549027" y="1638886"/>
             <a:ext cx="105408" cy="149637"/>
           </a:xfrm>
           <a:prstGeom prst="line">
@@ -4212,7 +4215,7 @@
         </p:nvCxnSpPr>
         <p:spPr>
           <a:xfrm rot="17163022" flipH="1">
-            <a:off x="1669403" y="1649938"/>
+            <a:off x="1681469" y="1637872"/>
             <a:ext cx="105408" cy="149637"/>
           </a:xfrm>
           <a:prstGeom prst="line">
@@ -4257,7 +4260,7 @@
         </p:nvCxnSpPr>
         <p:spPr>
           <a:xfrm rot="17163022" flipH="1">
-            <a:off x="1830104" y="1530493"/>
+            <a:off x="1839311" y="1515568"/>
             <a:ext cx="105408" cy="149637"/>
           </a:xfrm>
           <a:prstGeom prst="line">
@@ -4302,7 +4305,7 @@
         </p:nvCxnSpPr>
         <p:spPr>
           <a:xfrm rot="17163022" flipH="1">
-            <a:off x="1857472" y="1403371"/>
+            <a:off x="1869538" y="1391305"/>
             <a:ext cx="105408" cy="149637"/>
           </a:xfrm>
           <a:prstGeom prst="line">
@@ -4347,7 +4350,7 @@
         </p:nvCxnSpPr>
         <p:spPr>
           <a:xfrm rot="17163022" flipH="1">
-            <a:off x="1750683" y="1589777"/>
+            <a:off x="1770373" y="1585335"/>
             <a:ext cx="154059" cy="215668"/>
           </a:xfrm>
           <a:prstGeom prst="line">
@@ -4697,7 +4700,7 @@
     </p:spTree>
     <p:extLst>
       <p:ext uri="{BB962C8B-B14F-4D97-AF65-F5344CB8AC3E}">
-        <p14:creationId xmlns:p14="http://schemas.microsoft.com/office/powerpoint/2010/main" val="2765523893"/>
+        <p14:creationId xmlns:p14="http://schemas.microsoft.com/office/powerpoint/2010/main" val="1050022921"/>
       </p:ext>
     </p:extLst>
   </p:cSld>
@@ -4716,6 +4719,9 @@
                     <p:cTn id="3" fill="hold">
                       <p:stCondLst>
                         <p:cond delay="indefinite"/>
+                        <p:cond evt="onBegin" delay="0">
+                          <p:tn val="2"/>
+                        </p:cond>
                       </p:stCondLst>
                       <p:childTnLst>
                         <p:par>
@@ -4725,7 +4731,7 @@
                             </p:stCondLst>
                             <p:childTnLst>
                               <p:par>
-                                <p:cTn id="5" presetID="6" presetClass="emph" presetSubtype="0" fill="hold" nodeType="clickEffect">
+                                <p:cTn id="5" presetID="6" presetClass="emph" presetSubtype="0" fill="hold" nodeType="withEffect">
                                   <p:stCondLst>
                                     <p:cond delay="0"/>
                                   </p:stCondLst>
@@ -5291,7 +5297,7 @@
                                         </p:attrNameLst>
                                       </p:cBhvr>
                                       <p:to>
-                                        <a:srgbClr val="660066"/>
+                                        <a:srgbClr val="CC0000"/>
                                       </p:to>
                                     </p:animClr>
                                   </p:childTnLst>
@@ -5314,7 +5320,7 @@
                                         </p:attrNameLst>
                                       </p:cBhvr>
                                       <p:to>
-                                        <a:srgbClr val="660066"/>
+                                        <a:srgbClr val="CC0000"/>
                                       </p:to>
                                     </p:animClr>
                                     <p:set>
@@ -5351,7 +5357,7 @@
                                         </p:attrNameLst>
                                       </p:cBhvr>
                                       <p:to>
-                                        <a:srgbClr val="660066"/>
+                                        <a:srgbClr val="CC0000"/>
                                       </p:to>
                                     </p:animClr>
                                     <p:set>
@@ -5388,7 +5394,7 @@
                                         </p:attrNameLst>
                                       </p:cBhvr>
                                       <p:to>
-                                        <a:srgbClr val="660066"/>
+                                        <a:srgbClr val="CC0000"/>
                                       </p:to>
                                     </p:animClr>
                                     <p:set>
@@ -5425,7 +5431,7 @@
                                         </p:attrNameLst>
                                       </p:cBhvr>
                                       <p:to>
-                                        <a:srgbClr val="660066"/>
+                                        <a:srgbClr val="CC0000"/>
                                       </p:to>
                                     </p:animClr>
                                     <p:set>
@@ -5462,7 +5468,7 @@
                                         </p:attrNameLst>
                                       </p:cBhvr>
                                       <p:to>
-                                        <a:srgbClr val="660066"/>
+                                        <a:srgbClr val="CC0000"/>
                                       </p:to>
                                     </p:animClr>
                                     <p:set>
@@ -5517,7 +5523,7 @@
                                         </p:attrNameLst>
                                       </p:cBhvr>
                                       <p:to>
-                                        <a:schemeClr val="tx1"/>
+                                        <a:srgbClr val="800080"/>
                                       </p:to>
                                     </p:animClr>
                                   </p:childTnLst>
@@ -5600,1944 +5606,6 @@
 </file>
 
 <file path=ppt/slides/slide3.xml><?xml version="1.0" encoding="utf-8"?>
-<p:sld xmlns:a="http://schemas.openxmlformats.org/drawingml/2006/main" xmlns:r="http://schemas.openxmlformats.org/officeDocument/2006/relationships" xmlns:p="http://schemas.openxmlformats.org/presentationml/2006/main" show="0">
-  <p:cSld>
-    <p:spTree>
-      <p:nvGrpSpPr>
-        <p:cNvPr id="1" name=""/>
-        <p:cNvGrpSpPr/>
-        <p:nvPr/>
-      </p:nvGrpSpPr>
-      <p:grpSpPr>
-        <a:xfrm>
-          <a:off x="0" y="0"/>
-          <a:ext cx="0" cy="0"/>
-          <a:chOff x="0" y="0"/>
-          <a:chExt cx="0" cy="0"/>
-        </a:xfrm>
-      </p:grpSpPr>
-      <p:pic>
-        <p:nvPicPr>
-          <p:cNvPr id="6" name="Espace réservé du contenu 5">
-            <a:extLst>
-              <a:ext uri="{FF2B5EF4-FFF2-40B4-BE49-F238E27FC236}">
-                <a16:creationId xmlns:a16="http://schemas.microsoft.com/office/drawing/2014/main" id="{5FA232FE-4844-B7B8-7CDF-1BEDE936AFD9}"/>
-              </a:ext>
-            </a:extLst>
-          </p:cNvPr>
-          <p:cNvPicPr>
-            <a:picLocks noGrp="1" noChangeAspect="1"/>
-          </p:cNvPicPr>
-          <p:nvPr>
-            <p:ph idx="4294967295"/>
-          </p:nvPr>
-        </p:nvPicPr>
-        <p:blipFill>
-          <a:blip r:embed="rId2">
-            <a:extLst>
-              <a:ext uri="{28A0092B-C50C-407E-A947-70E740481C1C}">
-                <a14:useLocalDpi xmlns:a14="http://schemas.microsoft.com/office/drawing/2010/main" val="0"/>
-              </a:ext>
-            </a:extLst>
-          </a:blip>
-          <a:stretch>
-            <a:fillRect/>
-          </a:stretch>
-        </p:blipFill>
-        <p:spPr>
-          <a:xfrm>
-            <a:off x="572947" y="1"/>
-            <a:ext cx="6857999" cy="6857999"/>
-          </a:xfrm>
-          <a:prstGeom prst="rect">
-            <a:avLst/>
-          </a:prstGeom>
-        </p:spPr>
-      </p:pic>
-      <p:sp>
-        <p:nvSpPr>
-          <p:cNvPr id="8" name="ZoneTexte 7">
-            <a:extLst>
-              <a:ext uri="{FF2B5EF4-FFF2-40B4-BE49-F238E27FC236}">
-                <a16:creationId xmlns:a16="http://schemas.microsoft.com/office/drawing/2014/main" id="{18EA436A-0A3D-DE96-5E8E-80F52137E4A8}"/>
-              </a:ext>
-            </a:extLst>
-          </p:cNvPr>
-          <p:cNvSpPr txBox="1"/>
-          <p:nvPr/>
-        </p:nvSpPr>
-        <p:spPr>
-          <a:xfrm>
-            <a:off x="3704474" y="869492"/>
-            <a:ext cx="2939266" cy="1107996"/>
-          </a:xfrm>
-          <a:prstGeom prst="rect">
-            <a:avLst/>
-          </a:prstGeom>
-          <a:noFill/>
-        </p:spPr>
-        <p:txBody>
-          <a:bodyPr wrap="none" rtlCol="0">
-            <a:spAutoFit/>
-          </a:bodyPr>
-          <a:lstStyle/>
-          <a:p>
-            <a:r>
-              <a:rPr lang="fr-FR" sz="6600" b="1" dirty="0">
-                <a:solidFill>
-                  <a:schemeClr val="tx1">
-                    <a:lumMod val="50000"/>
-                    <a:lumOff val="50000"/>
-                  </a:schemeClr>
-                </a:solidFill>
-              </a:rPr>
-              <a:t>3     RSA</a:t>
-            </a:r>
-            <a:endParaRPr lang="fr-FR" sz="2400" b="1" dirty="0">
-              <a:solidFill>
-                <a:schemeClr val="tx1">
-                  <a:lumMod val="50000"/>
-                  <a:lumOff val="50000"/>
-                </a:schemeClr>
-              </a:solidFill>
-            </a:endParaRPr>
-          </a:p>
-        </p:txBody>
-      </p:sp>
-      <p:sp>
-        <p:nvSpPr>
-          <p:cNvPr id="9" name="ZoneTexte 8">
-            <a:extLst>
-              <a:ext uri="{FF2B5EF4-FFF2-40B4-BE49-F238E27FC236}">
-                <a16:creationId xmlns:a16="http://schemas.microsoft.com/office/drawing/2014/main" id="{3A1FC8C2-DC44-C7DE-69B8-37C3CE746FA8}"/>
-              </a:ext>
-            </a:extLst>
-          </p:cNvPr>
-          <p:cNvSpPr txBox="1"/>
-          <p:nvPr/>
-        </p:nvSpPr>
-        <p:spPr>
-          <a:xfrm>
-            <a:off x="3704474" y="2831269"/>
-            <a:ext cx="6075317" cy="1107996"/>
-          </a:xfrm>
-          <a:prstGeom prst="rect">
-            <a:avLst/>
-          </a:prstGeom>
-          <a:noFill/>
-        </p:spPr>
-        <p:txBody>
-          <a:bodyPr wrap="none" rtlCol="0">
-            <a:spAutoFit/>
-          </a:bodyPr>
-          <a:lstStyle/>
-          <a:p>
-            <a:r>
-              <a:rPr lang="fr-FR" sz="6600" b="1" dirty="0">
-                <a:solidFill>
-                  <a:schemeClr val="tx1">
-                    <a:lumMod val="50000"/>
-                    <a:lumOff val="50000"/>
-                  </a:schemeClr>
-                </a:solidFill>
-              </a:rPr>
-              <a:t>2           Encodage</a:t>
-            </a:r>
-            <a:endParaRPr lang="fr-FR" sz="3600" b="1" dirty="0">
-              <a:solidFill>
-                <a:schemeClr val="tx1">
-                  <a:lumMod val="50000"/>
-                  <a:lumOff val="50000"/>
-                </a:schemeClr>
-              </a:solidFill>
-            </a:endParaRPr>
-          </a:p>
-        </p:txBody>
-      </p:sp>
-      <p:sp>
-        <p:nvSpPr>
-          <p:cNvPr id="18" name="ZoneTexte 17">
-            <a:extLst>
-              <a:ext uri="{FF2B5EF4-FFF2-40B4-BE49-F238E27FC236}">
-                <a16:creationId xmlns:a16="http://schemas.microsoft.com/office/drawing/2014/main" id="{7027C70E-782C-18CF-D145-74A4BA3B06FC}"/>
-              </a:ext>
-            </a:extLst>
-          </p:cNvPr>
-          <p:cNvSpPr txBox="1"/>
-          <p:nvPr/>
-        </p:nvSpPr>
-        <p:spPr>
-          <a:xfrm>
-            <a:off x="3704474" y="5007833"/>
-            <a:ext cx="8119530" cy="1107996"/>
-          </a:xfrm>
-          <a:prstGeom prst="rect">
-            <a:avLst/>
-          </a:prstGeom>
-          <a:noFill/>
-        </p:spPr>
-        <p:txBody>
-          <a:bodyPr wrap="none" rtlCol="0">
-            <a:spAutoFit/>
-          </a:bodyPr>
-          <a:lstStyle/>
-          <a:p>
-            <a:r>
-              <a:rPr lang="fr-FR" sz="6600" b="1" dirty="0">
-                <a:solidFill>
-                  <a:schemeClr val="tx1">
-                    <a:lumMod val="50000"/>
-                    <a:lumOff val="50000"/>
-                  </a:schemeClr>
-                </a:solidFill>
-              </a:rPr>
-              <a:t>1                  Alice &amp; Bob</a:t>
-            </a:r>
-          </a:p>
-        </p:txBody>
-      </p:sp>
-    </p:spTree>
-    <p:extLst>
-      <p:ext uri="{BB962C8B-B14F-4D97-AF65-F5344CB8AC3E}">
-        <p14:creationId xmlns:p14="http://schemas.microsoft.com/office/powerpoint/2010/main" val="2897831147"/>
-      </p:ext>
-    </p:extLst>
-  </p:cSld>
-  <p:clrMapOvr>
-    <a:masterClrMapping/>
-  </p:clrMapOvr>
-  <p:timing>
-    <p:tnLst>
-      <p:par>
-        <p:cTn id="1" dur="indefinite" restart="never" nodeType="tmRoot">
-          <p:childTnLst>
-            <p:seq concurrent="1" nextAc="seek">
-              <p:cTn id="2" dur="indefinite" nodeType="mainSeq">
-                <p:childTnLst>
-                  <p:par>
-                    <p:cTn id="3" fill="hold">
-                      <p:stCondLst>
-                        <p:cond delay="indefinite"/>
-                      </p:stCondLst>
-                      <p:childTnLst>
-                        <p:par>
-                          <p:cTn id="4" fill="hold">
-                            <p:stCondLst>
-                              <p:cond delay="0"/>
-                            </p:stCondLst>
-                            <p:childTnLst>
-                              <p:par>
-                                <p:cTn id="5" presetID="3" presetClass="emph" presetSubtype="2" fill="hold" grpId="0" nodeType="clickEffect">
-                                  <p:stCondLst>
-                                    <p:cond delay="0"/>
-                                  </p:stCondLst>
-                                  <p:childTnLst>
-                                    <p:animClr clrSpc="rgb" dir="cw">
-                                      <p:cBhvr override="childStyle">
-                                        <p:cTn id="6" dur="500" fill="hold"/>
-                                        <p:tgtEl>
-                                          <p:spTgt spid="18"/>
-                                        </p:tgtEl>
-                                        <p:attrNameLst>
-                                          <p:attrName>style.color</p:attrName>
-                                        </p:attrNameLst>
-                                      </p:cBhvr>
-                                      <p:to>
-                                        <a:srgbClr val="00CC00"/>
-                                      </p:to>
-                                    </p:animClr>
-                                  </p:childTnLst>
-                                </p:cTn>
-                              </p:par>
-                            </p:childTnLst>
-                          </p:cTn>
-                        </p:par>
-                      </p:childTnLst>
-                    </p:cTn>
-                  </p:par>
-                  <p:par>
-                    <p:cTn id="7" fill="hold">
-                      <p:stCondLst>
-                        <p:cond delay="indefinite"/>
-                      </p:stCondLst>
-                      <p:childTnLst>
-                        <p:par>
-                          <p:cTn id="8" fill="hold">
-                            <p:stCondLst>
-                              <p:cond delay="0"/>
-                            </p:stCondLst>
-                            <p:childTnLst>
-                              <p:par>
-                                <p:cTn id="9" presetID="3" presetClass="emph" presetSubtype="2" fill="hold" grpId="0" nodeType="clickEffect">
-                                  <p:stCondLst>
-                                    <p:cond delay="0"/>
-                                  </p:stCondLst>
-                                  <p:childTnLst>
-                                    <p:animClr clrSpc="rgb" dir="cw">
-                                      <p:cBhvr override="childStyle">
-                                        <p:cTn id="10" dur="500" fill="hold"/>
-                                        <p:tgtEl>
-                                          <p:spTgt spid="9"/>
-                                        </p:tgtEl>
-                                        <p:attrNameLst>
-                                          <p:attrName>style.color</p:attrName>
-                                        </p:attrNameLst>
-                                      </p:cBhvr>
-                                      <p:to>
-                                        <a:srgbClr val="F0EA00"/>
-                                      </p:to>
-                                    </p:animClr>
-                                  </p:childTnLst>
-                                </p:cTn>
-                              </p:par>
-                            </p:childTnLst>
-                          </p:cTn>
-                        </p:par>
-                      </p:childTnLst>
-                    </p:cTn>
-                  </p:par>
-                  <p:par>
-                    <p:cTn id="11" fill="hold">
-                      <p:stCondLst>
-                        <p:cond delay="indefinite"/>
-                      </p:stCondLst>
-                      <p:childTnLst>
-                        <p:par>
-                          <p:cTn id="12" fill="hold">
-                            <p:stCondLst>
-                              <p:cond delay="0"/>
-                            </p:stCondLst>
-                            <p:childTnLst>
-                              <p:par>
-                                <p:cTn id="13" presetID="3" presetClass="emph" presetSubtype="2" fill="hold" grpId="0" nodeType="clickEffect">
-                                  <p:stCondLst>
-                                    <p:cond delay="0"/>
-                                  </p:stCondLst>
-                                  <p:childTnLst>
-                                    <p:animClr clrSpc="rgb" dir="cw">
-                                      <p:cBhvr override="childStyle">
-                                        <p:cTn id="14" dur="500" fill="hold"/>
-                                        <p:tgtEl>
-                                          <p:spTgt spid="8"/>
-                                        </p:tgtEl>
-                                        <p:attrNameLst>
-                                          <p:attrName>style.color</p:attrName>
-                                        </p:attrNameLst>
-                                      </p:cBhvr>
-                                      <p:to>
-                                        <a:schemeClr val="accent2"/>
-                                      </p:to>
-                                    </p:animClr>
-                                  </p:childTnLst>
-                                </p:cTn>
-                              </p:par>
-                            </p:childTnLst>
-                          </p:cTn>
-                        </p:par>
-                      </p:childTnLst>
-                    </p:cTn>
-                  </p:par>
-                </p:childTnLst>
-              </p:cTn>
-              <p:prevCondLst>
-                <p:cond evt="onPrev" delay="0">
-                  <p:tgtEl>
-                    <p:sldTgt/>
-                  </p:tgtEl>
-                </p:cond>
-              </p:prevCondLst>
-              <p:nextCondLst>
-                <p:cond evt="onNext" delay="0">
-                  <p:tgtEl>
-                    <p:sldTgt/>
-                  </p:tgtEl>
-                </p:cond>
-              </p:nextCondLst>
-            </p:seq>
-          </p:childTnLst>
-        </p:cTn>
-      </p:par>
-    </p:tnLst>
-    <p:bldLst>
-      <p:bldP spid="8" grpId="0"/>
-      <p:bldP spid="9" grpId="0"/>
-      <p:bldP spid="18" grpId="0"/>
-    </p:bldLst>
-  </p:timing>
-</p:sld>
-</file>
-
-<file path=ppt/slides/slide4.xml><?xml version="1.0" encoding="utf-8"?>
-<p:sld xmlns:a="http://schemas.openxmlformats.org/drawingml/2006/main" xmlns:r="http://schemas.openxmlformats.org/officeDocument/2006/relationships" xmlns:p="http://schemas.openxmlformats.org/presentationml/2006/main" show="0">
-  <p:cSld>
-    <p:spTree>
-      <p:nvGrpSpPr>
-        <p:cNvPr id="1" name=""/>
-        <p:cNvGrpSpPr/>
-        <p:nvPr/>
-      </p:nvGrpSpPr>
-      <p:grpSpPr>
-        <a:xfrm>
-          <a:off x="0" y="0"/>
-          <a:ext cx="0" cy="0"/>
-          <a:chOff x="0" y="0"/>
-          <a:chExt cx="0" cy="0"/>
-        </a:xfrm>
-      </p:grpSpPr>
-      <p:pic>
-        <p:nvPicPr>
-          <p:cNvPr id="3" name="Image 2">
-            <a:extLst>
-              <a:ext uri="{FF2B5EF4-FFF2-40B4-BE49-F238E27FC236}">
-                <a16:creationId xmlns:a16="http://schemas.microsoft.com/office/drawing/2014/main" id="{503940DC-B7CE-F426-30C0-654000CCDD47}"/>
-              </a:ext>
-            </a:extLst>
-          </p:cNvPr>
-          <p:cNvPicPr>
-            <a:picLocks noChangeAspect="1"/>
-          </p:cNvPicPr>
-          <p:nvPr/>
-        </p:nvPicPr>
-        <p:blipFill>
-          <a:blip r:embed="rId2">
-            <a:extLst>
-              <a:ext uri="{28A0092B-C50C-407E-A947-70E740481C1C}">
-                <a14:useLocalDpi xmlns:a14="http://schemas.microsoft.com/office/drawing/2010/main" val="0"/>
-              </a:ext>
-            </a:extLst>
-          </a:blip>
-          <a:srcRect/>
-          <a:stretch/>
-        </p:blipFill>
-        <p:spPr>
-          <a:xfrm>
-            <a:off x="0" y="0"/>
-            <a:ext cx="12191999" cy="6857999"/>
-          </a:xfrm>
-          <a:prstGeom prst="rect">
-            <a:avLst/>
-          </a:prstGeom>
-        </p:spPr>
-      </p:pic>
-      <p:pic>
-        <p:nvPicPr>
-          <p:cNvPr id="18" name="Image 17">
-            <a:extLst>
-              <a:ext uri="{FF2B5EF4-FFF2-40B4-BE49-F238E27FC236}">
-                <a16:creationId xmlns:a16="http://schemas.microsoft.com/office/drawing/2014/main" id="{787151FB-2BEF-3526-5FE3-BCC773AF9FA9}"/>
-              </a:ext>
-            </a:extLst>
-          </p:cNvPr>
-          <p:cNvPicPr>
-            <a:picLocks noChangeAspect="1"/>
-          </p:cNvPicPr>
-          <p:nvPr/>
-        </p:nvPicPr>
-        <p:blipFill>
-          <a:blip r:embed="rId3">
-            <a:extLst>
-              <a:ext uri="{28A0092B-C50C-407E-A947-70E740481C1C}">
-                <a14:useLocalDpi xmlns:a14="http://schemas.microsoft.com/office/drawing/2010/main" val="0"/>
-              </a:ext>
-            </a:extLst>
-          </a:blip>
-          <a:srcRect/>
-          <a:stretch/>
-        </p:blipFill>
-        <p:spPr>
-          <a:xfrm rot="16520495">
-            <a:off x="716407" y="497138"/>
-            <a:ext cx="1402949" cy="1352443"/>
-          </a:xfrm>
-          <a:prstGeom prst="rect">
-            <a:avLst/>
-          </a:prstGeom>
-        </p:spPr>
-      </p:pic>
-      <p:pic>
-        <p:nvPicPr>
-          <p:cNvPr id="21" name="Image 20">
-            <a:extLst>
-              <a:ext uri="{FF2B5EF4-FFF2-40B4-BE49-F238E27FC236}">
-                <a16:creationId xmlns:a16="http://schemas.microsoft.com/office/drawing/2014/main" id="{A29EE7D8-BE25-9A1E-6F3B-90C386202535}"/>
-              </a:ext>
-            </a:extLst>
-          </p:cNvPr>
-          <p:cNvPicPr>
-            <a:picLocks noChangeAspect="1"/>
-          </p:cNvPicPr>
-          <p:nvPr/>
-        </p:nvPicPr>
-        <p:blipFill>
-          <a:blip r:embed="rId4">
-            <a:extLst>
-              <a:ext uri="{28A0092B-C50C-407E-A947-70E740481C1C}">
-                <a14:useLocalDpi xmlns:a14="http://schemas.microsoft.com/office/drawing/2010/main" val="0"/>
-              </a:ext>
-            </a:extLst>
-          </a:blip>
-          <a:srcRect/>
-          <a:stretch/>
-        </p:blipFill>
-        <p:spPr>
-          <a:xfrm rot="16520495">
-            <a:off x="715012" y="497138"/>
-            <a:ext cx="1402949" cy="1352443"/>
-          </a:xfrm>
-          <a:prstGeom prst="rect">
-            <a:avLst/>
-          </a:prstGeom>
-        </p:spPr>
-      </p:pic>
-      <p:cxnSp>
-        <p:nvCxnSpPr>
-          <p:cNvPr id="12" name="Connecteur droit 11">
-            <a:extLst>
-              <a:ext uri="{FF2B5EF4-FFF2-40B4-BE49-F238E27FC236}">
-                <a16:creationId xmlns:a16="http://schemas.microsoft.com/office/drawing/2014/main" id="{265F7E93-E2F0-C97E-5D55-417CBA1A4F8C}"/>
-              </a:ext>
-            </a:extLst>
-          </p:cNvPr>
-          <p:cNvCxnSpPr>
-            <a:cxnSpLocks/>
-          </p:cNvCxnSpPr>
-          <p:nvPr/>
-        </p:nvCxnSpPr>
-        <p:spPr>
-          <a:xfrm rot="17163022" flipH="1">
-            <a:off x="1549027" y="1638886"/>
-            <a:ext cx="105408" cy="149637"/>
-          </a:xfrm>
-          <a:prstGeom prst="line">
-            <a:avLst/>
-          </a:prstGeom>
-          <a:ln w="63500" cap="rnd">
-            <a:solidFill>
-              <a:schemeClr val="bg1">
-                <a:lumMod val="50000"/>
-              </a:schemeClr>
-            </a:solidFill>
-          </a:ln>
-        </p:spPr>
-        <p:style>
-          <a:lnRef idx="1">
-            <a:schemeClr val="dk1"/>
-          </a:lnRef>
-          <a:fillRef idx="0">
-            <a:schemeClr val="dk1"/>
-          </a:fillRef>
-          <a:effectRef idx="0">
-            <a:schemeClr val="dk1"/>
-          </a:effectRef>
-          <a:fontRef idx="minor">
-            <a:schemeClr val="tx1"/>
-          </a:fontRef>
-        </p:style>
-      </p:cxnSp>
-      <p:cxnSp>
-        <p:nvCxnSpPr>
-          <p:cNvPr id="13" name="Connecteur droit 12">
-            <a:extLst>
-              <a:ext uri="{FF2B5EF4-FFF2-40B4-BE49-F238E27FC236}">
-                <a16:creationId xmlns:a16="http://schemas.microsoft.com/office/drawing/2014/main" id="{C9455344-E8E8-9E92-0ECE-ED3F66E396BE}"/>
-              </a:ext>
-            </a:extLst>
-          </p:cNvPr>
-          <p:cNvCxnSpPr>
-            <a:cxnSpLocks/>
-          </p:cNvCxnSpPr>
-          <p:nvPr/>
-        </p:nvCxnSpPr>
-        <p:spPr>
-          <a:xfrm rot="17163022" flipH="1">
-            <a:off x="1681469" y="1637872"/>
-            <a:ext cx="105408" cy="149637"/>
-          </a:xfrm>
-          <a:prstGeom prst="line">
-            <a:avLst/>
-          </a:prstGeom>
-          <a:ln w="63500" cap="rnd">
-            <a:solidFill>
-              <a:schemeClr val="bg1">
-                <a:lumMod val="50000"/>
-              </a:schemeClr>
-            </a:solidFill>
-          </a:ln>
-        </p:spPr>
-        <p:style>
-          <a:lnRef idx="1">
-            <a:schemeClr val="dk1"/>
-          </a:lnRef>
-          <a:fillRef idx="0">
-            <a:schemeClr val="dk1"/>
-          </a:fillRef>
-          <a:effectRef idx="0">
-            <a:schemeClr val="dk1"/>
-          </a:effectRef>
-          <a:fontRef idx="minor">
-            <a:schemeClr val="tx1"/>
-          </a:fontRef>
-        </p:style>
-      </p:cxnSp>
-      <p:cxnSp>
-        <p:nvCxnSpPr>
-          <p:cNvPr id="14" name="Connecteur droit 13">
-            <a:extLst>
-              <a:ext uri="{FF2B5EF4-FFF2-40B4-BE49-F238E27FC236}">
-                <a16:creationId xmlns:a16="http://schemas.microsoft.com/office/drawing/2014/main" id="{C8CAF81C-5AB3-636E-F617-D77E1228479E}"/>
-              </a:ext>
-            </a:extLst>
-          </p:cNvPr>
-          <p:cNvCxnSpPr>
-            <a:cxnSpLocks/>
-          </p:cNvCxnSpPr>
-          <p:nvPr/>
-        </p:nvCxnSpPr>
-        <p:spPr>
-          <a:xfrm rot="17163022" flipH="1">
-            <a:off x="1839311" y="1515568"/>
-            <a:ext cx="105408" cy="149637"/>
-          </a:xfrm>
-          <a:prstGeom prst="line">
-            <a:avLst/>
-          </a:prstGeom>
-          <a:ln w="63500" cap="rnd">
-            <a:solidFill>
-              <a:schemeClr val="bg1">
-                <a:lumMod val="50000"/>
-              </a:schemeClr>
-            </a:solidFill>
-          </a:ln>
-        </p:spPr>
-        <p:style>
-          <a:lnRef idx="1">
-            <a:schemeClr val="dk1"/>
-          </a:lnRef>
-          <a:fillRef idx="0">
-            <a:schemeClr val="dk1"/>
-          </a:fillRef>
-          <a:effectRef idx="0">
-            <a:schemeClr val="dk1"/>
-          </a:effectRef>
-          <a:fontRef idx="minor">
-            <a:schemeClr val="tx1"/>
-          </a:fontRef>
-        </p:style>
-      </p:cxnSp>
-      <p:cxnSp>
-        <p:nvCxnSpPr>
-          <p:cNvPr id="15" name="Connecteur droit 14">
-            <a:extLst>
-              <a:ext uri="{FF2B5EF4-FFF2-40B4-BE49-F238E27FC236}">
-                <a16:creationId xmlns:a16="http://schemas.microsoft.com/office/drawing/2014/main" id="{DCB5296A-E305-895D-8C0A-14714336E228}"/>
-              </a:ext>
-            </a:extLst>
-          </p:cNvPr>
-          <p:cNvCxnSpPr>
-            <a:cxnSpLocks/>
-          </p:cNvCxnSpPr>
-          <p:nvPr/>
-        </p:nvCxnSpPr>
-        <p:spPr>
-          <a:xfrm rot="17163022" flipH="1">
-            <a:off x="1869538" y="1391305"/>
-            <a:ext cx="105408" cy="149637"/>
-          </a:xfrm>
-          <a:prstGeom prst="line">
-            <a:avLst/>
-          </a:prstGeom>
-          <a:ln w="63500" cap="rnd">
-            <a:solidFill>
-              <a:schemeClr val="bg1">
-                <a:lumMod val="50000"/>
-              </a:schemeClr>
-            </a:solidFill>
-          </a:ln>
-        </p:spPr>
-        <p:style>
-          <a:lnRef idx="1">
-            <a:schemeClr val="dk1"/>
-          </a:lnRef>
-          <a:fillRef idx="0">
-            <a:schemeClr val="dk1"/>
-          </a:fillRef>
-          <a:effectRef idx="0">
-            <a:schemeClr val="dk1"/>
-          </a:effectRef>
-          <a:fontRef idx="minor">
-            <a:schemeClr val="tx1"/>
-          </a:fontRef>
-        </p:style>
-      </p:cxnSp>
-      <p:cxnSp>
-        <p:nvCxnSpPr>
-          <p:cNvPr id="16" name="Connecteur droit 15">
-            <a:extLst>
-              <a:ext uri="{FF2B5EF4-FFF2-40B4-BE49-F238E27FC236}">
-                <a16:creationId xmlns:a16="http://schemas.microsoft.com/office/drawing/2014/main" id="{5FC2B7A1-5663-E831-3277-CBAD7E00FEF2}"/>
-              </a:ext>
-            </a:extLst>
-          </p:cNvPr>
-          <p:cNvCxnSpPr>
-            <a:cxnSpLocks/>
-          </p:cNvCxnSpPr>
-          <p:nvPr/>
-        </p:nvCxnSpPr>
-        <p:spPr>
-          <a:xfrm rot="17163022" flipH="1">
-            <a:off x="1770373" y="1585335"/>
-            <a:ext cx="154059" cy="215668"/>
-          </a:xfrm>
-          <a:prstGeom prst="line">
-            <a:avLst/>
-          </a:prstGeom>
-          <a:ln w="63500" cap="rnd">
-            <a:solidFill>
-              <a:schemeClr val="bg1">
-                <a:lumMod val="50000"/>
-              </a:schemeClr>
-            </a:solidFill>
-          </a:ln>
-        </p:spPr>
-        <p:style>
-          <a:lnRef idx="1">
-            <a:schemeClr val="dk1"/>
-          </a:lnRef>
-          <a:fillRef idx="0">
-            <a:schemeClr val="dk1"/>
-          </a:fillRef>
-          <a:effectRef idx="0">
-            <a:schemeClr val="dk1"/>
-          </a:effectRef>
-          <a:fontRef idx="minor">
-            <a:schemeClr val="tx1"/>
-          </a:fontRef>
-        </p:style>
-      </p:cxnSp>
-      <p:sp>
-        <p:nvSpPr>
-          <p:cNvPr id="27" name="Accolade fermante 26">
-            <a:extLst>
-              <a:ext uri="{FF2B5EF4-FFF2-40B4-BE49-F238E27FC236}">
-                <a16:creationId xmlns:a16="http://schemas.microsoft.com/office/drawing/2014/main" id="{9E616FB4-142A-A07C-C380-153A1F06C551}"/>
-              </a:ext>
-            </a:extLst>
-          </p:cNvPr>
-          <p:cNvSpPr/>
-          <p:nvPr/>
-        </p:nvSpPr>
-        <p:spPr>
-          <a:xfrm>
-            <a:off x="8379588" y="408899"/>
-            <a:ext cx="469257" cy="2910840"/>
-          </a:xfrm>
-          <a:prstGeom prst="rightBrace">
-            <a:avLst/>
-          </a:prstGeom>
-          <a:ln w="50800" cap="rnd">
-            <a:solidFill>
-              <a:schemeClr val="bg1">
-                <a:lumMod val="50000"/>
-              </a:schemeClr>
-            </a:solidFill>
-          </a:ln>
-        </p:spPr>
-        <p:style>
-          <a:lnRef idx="1">
-            <a:schemeClr val="accent3"/>
-          </a:lnRef>
-          <a:fillRef idx="0">
-            <a:schemeClr val="accent3"/>
-          </a:fillRef>
-          <a:effectRef idx="0">
-            <a:schemeClr val="accent3"/>
-          </a:effectRef>
-          <a:fontRef idx="minor">
-            <a:schemeClr val="tx1"/>
-          </a:fontRef>
-        </p:style>
-        <p:txBody>
-          <a:bodyPr rtlCol="0" anchor="ctr"/>
-          <a:lstStyle/>
-          <a:p>
-            <a:pPr algn="ctr"/>
-            <a:endParaRPr lang="fr-FR">
-              <a:noFill/>
-            </a:endParaRPr>
-          </a:p>
-        </p:txBody>
-      </p:sp>
-      <p:sp>
-        <p:nvSpPr>
-          <p:cNvPr id="28" name="Accolade fermante 27">
-            <a:extLst>
-              <a:ext uri="{FF2B5EF4-FFF2-40B4-BE49-F238E27FC236}">
-                <a16:creationId xmlns:a16="http://schemas.microsoft.com/office/drawing/2014/main" id="{3C77989A-ABAF-6527-E9C6-6B53BE72B362}"/>
-              </a:ext>
-            </a:extLst>
-          </p:cNvPr>
-          <p:cNvSpPr/>
-          <p:nvPr/>
-        </p:nvSpPr>
-        <p:spPr>
-          <a:xfrm>
-            <a:off x="8379588" y="3538261"/>
-            <a:ext cx="510540" cy="2910840"/>
-          </a:xfrm>
-          <a:prstGeom prst="rightBrace">
-            <a:avLst/>
-          </a:prstGeom>
-          <a:ln w="50800" cap="rnd">
-            <a:solidFill>
-              <a:schemeClr val="bg1">
-                <a:lumMod val="50000"/>
-              </a:schemeClr>
-            </a:solidFill>
-          </a:ln>
-        </p:spPr>
-        <p:style>
-          <a:lnRef idx="1">
-            <a:schemeClr val="accent3"/>
-          </a:lnRef>
-          <a:fillRef idx="0">
-            <a:schemeClr val="accent3"/>
-          </a:fillRef>
-          <a:effectRef idx="0">
-            <a:schemeClr val="accent3"/>
-          </a:effectRef>
-          <a:fontRef idx="minor">
-            <a:schemeClr val="tx1"/>
-          </a:fontRef>
-        </p:style>
-        <p:txBody>
-          <a:bodyPr rtlCol="0" anchor="ctr"/>
-          <a:lstStyle/>
-          <a:p>
-            <a:pPr algn="ctr"/>
-            <a:endParaRPr lang="fr-FR">
-              <a:noFill/>
-            </a:endParaRPr>
-          </a:p>
-        </p:txBody>
-      </p:sp>
-      <p:sp>
-        <p:nvSpPr>
-          <p:cNvPr id="29" name="ZoneTexte 28">
-            <a:extLst>
-              <a:ext uri="{FF2B5EF4-FFF2-40B4-BE49-F238E27FC236}">
-                <a16:creationId xmlns:a16="http://schemas.microsoft.com/office/drawing/2014/main" id="{26DDDD20-E3FA-CF01-CFC6-9D167C68141F}"/>
-              </a:ext>
-            </a:extLst>
-          </p:cNvPr>
-          <p:cNvSpPr txBox="1"/>
-          <p:nvPr/>
-        </p:nvSpPr>
-        <p:spPr>
-          <a:xfrm>
-            <a:off x="9082267" y="4701293"/>
-            <a:ext cx="2098876" cy="584775"/>
-          </a:xfrm>
-          <a:prstGeom prst="rect">
-            <a:avLst/>
-          </a:prstGeom>
-          <a:noFill/>
-        </p:spPr>
-        <p:txBody>
-          <a:bodyPr wrap="square" rtlCol="0">
-            <a:spAutoFit/>
-          </a:bodyPr>
-          <a:lstStyle/>
-          <a:p>
-            <a:r>
-              <a:rPr lang="fr-FR" sz="3200" b="1" dirty="0">
-                <a:solidFill>
-                  <a:schemeClr val="tx1">
-                    <a:lumMod val="50000"/>
-                    <a:lumOff val="50000"/>
-                  </a:schemeClr>
-                </a:solidFill>
-              </a:rPr>
-              <a:t>1</a:t>
-            </a:r>
-            <a:r>
-              <a:rPr lang="fr-FR" sz="3200" b="1" baseline="30000" dirty="0">
-                <a:solidFill>
-                  <a:schemeClr val="tx1">
-                    <a:lumMod val="50000"/>
-                    <a:lumOff val="50000"/>
-                  </a:schemeClr>
-                </a:solidFill>
-              </a:rPr>
-              <a:t>ère</a:t>
-            </a:r>
-            <a:r>
-              <a:rPr lang="fr-FR" sz="3200" b="1" dirty="0">
-                <a:solidFill>
-                  <a:schemeClr val="tx1">
-                    <a:lumMod val="50000"/>
-                    <a:lumOff val="50000"/>
-                  </a:schemeClr>
-                </a:solidFill>
-              </a:rPr>
-              <a:t> Partie</a:t>
-            </a:r>
-          </a:p>
-        </p:txBody>
-      </p:sp>
-      <p:sp>
-        <p:nvSpPr>
-          <p:cNvPr id="30" name="ZoneTexte 29">
-            <a:extLst>
-              <a:ext uri="{FF2B5EF4-FFF2-40B4-BE49-F238E27FC236}">
-                <a16:creationId xmlns:a16="http://schemas.microsoft.com/office/drawing/2014/main" id="{139794F0-F297-9FFD-D4D2-CA649E72A603}"/>
-              </a:ext>
-            </a:extLst>
-          </p:cNvPr>
-          <p:cNvSpPr txBox="1"/>
-          <p:nvPr/>
-        </p:nvSpPr>
-        <p:spPr>
-          <a:xfrm>
-            <a:off x="9082267" y="1571931"/>
-            <a:ext cx="2098876" cy="584775"/>
-          </a:xfrm>
-          <a:prstGeom prst="rect">
-            <a:avLst/>
-          </a:prstGeom>
-          <a:noFill/>
-        </p:spPr>
-        <p:txBody>
-          <a:bodyPr wrap="square" rtlCol="0">
-            <a:spAutoFit/>
-          </a:bodyPr>
-          <a:lstStyle/>
-          <a:p>
-            <a:r>
-              <a:rPr lang="fr-FR" sz="3200" b="1" dirty="0">
-                <a:solidFill>
-                  <a:schemeClr val="tx1">
-                    <a:lumMod val="50000"/>
-                    <a:lumOff val="50000"/>
-                  </a:schemeClr>
-                </a:solidFill>
-              </a:rPr>
-              <a:t>2</a:t>
-            </a:r>
-            <a:r>
-              <a:rPr lang="fr-FR" sz="3200" b="1" baseline="30000" dirty="0">
-                <a:solidFill>
-                  <a:schemeClr val="tx1">
-                    <a:lumMod val="50000"/>
-                    <a:lumOff val="50000"/>
-                  </a:schemeClr>
-                </a:solidFill>
-              </a:rPr>
-              <a:t>ème</a:t>
-            </a:r>
-            <a:r>
-              <a:rPr lang="fr-FR" sz="3200" b="1" dirty="0">
-                <a:solidFill>
-                  <a:schemeClr val="tx1">
-                    <a:lumMod val="50000"/>
-                    <a:lumOff val="50000"/>
-                  </a:schemeClr>
-                </a:solidFill>
-              </a:rPr>
-              <a:t> Partie</a:t>
-            </a:r>
-          </a:p>
-        </p:txBody>
-      </p:sp>
-      <p:sp>
-        <p:nvSpPr>
-          <p:cNvPr id="2" name="ZoneTexte 1">
-            <a:extLst>
-              <a:ext uri="{FF2B5EF4-FFF2-40B4-BE49-F238E27FC236}">
-                <a16:creationId xmlns:a16="http://schemas.microsoft.com/office/drawing/2014/main" id="{3D0E2BE3-E652-FCAD-7AA5-4EF99CAAFA63}"/>
-              </a:ext>
-            </a:extLst>
-          </p:cNvPr>
-          <p:cNvSpPr txBox="1"/>
-          <p:nvPr/>
-        </p:nvSpPr>
-        <p:spPr>
-          <a:xfrm>
-            <a:off x="2885166" y="1262693"/>
-            <a:ext cx="2553904" cy="600164"/>
-          </a:xfrm>
-          <a:prstGeom prst="rect">
-            <a:avLst/>
-          </a:prstGeom>
-          <a:noFill/>
-        </p:spPr>
-        <p:txBody>
-          <a:bodyPr wrap="none" rtlCol="0">
-            <a:spAutoFit/>
-          </a:bodyPr>
-          <a:lstStyle/>
-          <a:p>
-            <a:r>
-              <a:rPr lang="fr-FR" sz="3300" b="1" dirty="0">
-                <a:solidFill>
-                  <a:schemeClr val="tx1">
-                    <a:lumMod val="50000"/>
-                    <a:lumOff val="50000"/>
-                  </a:schemeClr>
-                </a:solidFill>
-              </a:rPr>
-              <a:t>4	ElGamal</a:t>
-            </a:r>
-          </a:p>
-        </p:txBody>
-      </p:sp>
-      <p:sp>
-        <p:nvSpPr>
-          <p:cNvPr id="4" name="ZoneTexte 3">
-            <a:extLst>
-              <a:ext uri="{FF2B5EF4-FFF2-40B4-BE49-F238E27FC236}">
-                <a16:creationId xmlns:a16="http://schemas.microsoft.com/office/drawing/2014/main" id="{E3A8B1D7-4211-982D-FFCA-3338F5EEC9BC}"/>
-              </a:ext>
-            </a:extLst>
-          </p:cNvPr>
-          <p:cNvSpPr txBox="1"/>
-          <p:nvPr/>
-        </p:nvSpPr>
-        <p:spPr>
-          <a:xfrm>
-            <a:off x="2885166" y="441839"/>
-            <a:ext cx="4477444" cy="600164"/>
-          </a:xfrm>
-          <a:prstGeom prst="rect">
-            <a:avLst/>
-          </a:prstGeom>
-          <a:noFill/>
-        </p:spPr>
-        <p:txBody>
-          <a:bodyPr wrap="none" rtlCol="0">
-            <a:spAutoFit/>
-          </a:bodyPr>
-          <a:lstStyle/>
-          <a:p>
-            <a:r>
-              <a:rPr lang="fr-FR" sz="3300" b="1" dirty="0">
-                <a:solidFill>
-                  <a:schemeClr val="tx1">
-                    <a:lumMod val="50000"/>
-                    <a:lumOff val="50000"/>
-                  </a:schemeClr>
-                </a:solidFill>
-              </a:rPr>
-              <a:t>5	Courbes Elliptiques</a:t>
-            </a:r>
-          </a:p>
-        </p:txBody>
-      </p:sp>
-    </p:spTree>
-    <p:extLst>
-      <p:ext uri="{BB962C8B-B14F-4D97-AF65-F5344CB8AC3E}">
-        <p14:creationId xmlns:p14="http://schemas.microsoft.com/office/powerpoint/2010/main" val="1050022921"/>
-      </p:ext>
-    </p:extLst>
-  </p:cSld>
-  <p:clrMapOvr>
-    <a:masterClrMapping/>
-  </p:clrMapOvr>
-  <p:timing>
-    <p:tnLst>
-      <p:par>
-        <p:cTn id="1" dur="indefinite" restart="never" nodeType="tmRoot">
-          <p:childTnLst>
-            <p:seq concurrent="1" nextAc="seek">
-              <p:cTn id="2" dur="indefinite" nodeType="mainSeq">
-                <p:childTnLst>
-                  <p:par>
-                    <p:cTn id="3" fill="hold">
-                      <p:stCondLst>
-                        <p:cond delay="indefinite"/>
-                      </p:stCondLst>
-                      <p:childTnLst>
-                        <p:par>
-                          <p:cTn id="4" fill="hold">
-                            <p:stCondLst>
-                              <p:cond delay="0"/>
-                            </p:stCondLst>
-                            <p:childTnLst>
-                              <p:par>
-                                <p:cTn id="5" presetID="6" presetClass="emph" presetSubtype="0" fill="hold" nodeType="clickEffect">
-                                  <p:stCondLst>
-                                    <p:cond delay="0"/>
-                                  </p:stCondLst>
-                                  <p:childTnLst>
-                                    <p:animScale>
-                                      <p:cBhvr>
-                                        <p:cTn id="6" dur="500" fill="hold"/>
-                                        <p:tgtEl>
-                                          <p:spTgt spid="3"/>
-                                        </p:tgtEl>
-                                      </p:cBhvr>
-                                      <p:by x="50000" y="50000"/>
-                                    </p:animScale>
-                                  </p:childTnLst>
-                                </p:cTn>
-                              </p:par>
-                              <p:par>
-                                <p:cTn id="7" presetID="42" presetClass="path" presetSubtype="0" fill="hold" nodeType="withEffect">
-                                  <p:stCondLst>
-                                    <p:cond delay="0"/>
-                                  </p:stCondLst>
-                                  <p:childTnLst>
-                                    <p:animMotion origin="layout" path="M 0 0 L -0.16185 0.25787 " pathEditMode="relative" rAng="0" ptsTypes="AA">
-                                      <p:cBhvr>
-                                        <p:cTn id="8" dur="500" fill="hold"/>
-                                        <p:tgtEl>
-                                          <p:spTgt spid="3"/>
-                                        </p:tgtEl>
-                                        <p:attrNameLst>
-                                          <p:attrName>ppt_x</p:attrName>
-                                          <p:attrName>ppt_y</p:attrName>
-                                        </p:attrNameLst>
-                                      </p:cBhvr>
-                                      <p:rCtr x="-8099" y="12894"/>
-                                    </p:animMotion>
-                                  </p:childTnLst>
-                                </p:cTn>
-                              </p:par>
-                            </p:childTnLst>
-                          </p:cTn>
-                        </p:par>
-                      </p:childTnLst>
-                    </p:cTn>
-                  </p:par>
-                  <p:par>
-                    <p:cTn id="9" fill="hold">
-                      <p:stCondLst>
-                        <p:cond delay="indefinite"/>
-                      </p:stCondLst>
-                      <p:childTnLst>
-                        <p:par>
-                          <p:cTn id="10" fill="hold">
-                            <p:stCondLst>
-                              <p:cond delay="0"/>
-                            </p:stCondLst>
-                            <p:childTnLst>
-                              <p:par>
-                                <p:cTn id="11" presetID="10" presetClass="entr" presetSubtype="0" fill="hold" grpId="0" nodeType="clickEffect">
-                                  <p:stCondLst>
-                                    <p:cond delay="0"/>
-                                  </p:stCondLst>
-                                  <p:childTnLst>
-                                    <p:set>
-                                      <p:cBhvr>
-                                        <p:cTn id="12" dur="1" fill="hold">
-                                          <p:stCondLst>
-                                            <p:cond delay="0"/>
-                                          </p:stCondLst>
-                                        </p:cTn>
-                                        <p:tgtEl>
-                                          <p:spTgt spid="28"/>
-                                        </p:tgtEl>
-                                        <p:attrNameLst>
-                                          <p:attrName>style.visibility</p:attrName>
-                                        </p:attrNameLst>
-                                      </p:cBhvr>
-                                      <p:to>
-                                        <p:strVal val="visible"/>
-                                      </p:to>
-                                    </p:set>
-                                    <p:animEffect transition="in" filter="fade">
-                                      <p:cBhvr>
-                                        <p:cTn id="13" dur="250"/>
-                                        <p:tgtEl>
-                                          <p:spTgt spid="28"/>
-                                        </p:tgtEl>
-                                      </p:cBhvr>
-                                    </p:animEffect>
-                                  </p:childTnLst>
-                                </p:cTn>
-                              </p:par>
-                              <p:par>
-                                <p:cTn id="14" presetID="10" presetClass="entr" presetSubtype="0" fill="hold" grpId="0" nodeType="withEffect">
-                                  <p:stCondLst>
-                                    <p:cond delay="0"/>
-                                  </p:stCondLst>
-                                  <p:childTnLst>
-                                    <p:set>
-                                      <p:cBhvr>
-                                        <p:cTn id="15" dur="1" fill="hold">
-                                          <p:stCondLst>
-                                            <p:cond delay="0"/>
-                                          </p:stCondLst>
-                                        </p:cTn>
-                                        <p:tgtEl>
-                                          <p:spTgt spid="29"/>
-                                        </p:tgtEl>
-                                        <p:attrNameLst>
-                                          <p:attrName>style.visibility</p:attrName>
-                                        </p:attrNameLst>
-                                      </p:cBhvr>
-                                      <p:to>
-                                        <p:strVal val="visible"/>
-                                      </p:to>
-                                    </p:set>
-                                    <p:animEffect transition="in" filter="fade">
-                                      <p:cBhvr>
-                                        <p:cTn id="16" dur="250"/>
-                                        <p:tgtEl>
-                                          <p:spTgt spid="29"/>
-                                        </p:tgtEl>
-                                      </p:cBhvr>
-                                    </p:animEffect>
-                                  </p:childTnLst>
-                                </p:cTn>
-                              </p:par>
-                            </p:childTnLst>
-                          </p:cTn>
-                        </p:par>
-                      </p:childTnLst>
-                    </p:cTn>
-                  </p:par>
-                  <p:par>
-                    <p:cTn id="17" fill="hold">
-                      <p:stCondLst>
-                        <p:cond delay="indefinite"/>
-                      </p:stCondLst>
-                      <p:childTnLst>
-                        <p:par>
-                          <p:cTn id="18" fill="hold">
-                            <p:stCondLst>
-                              <p:cond delay="0"/>
-                            </p:stCondLst>
-                            <p:childTnLst>
-                              <p:par>
-                                <p:cTn id="19" presetID="10" presetClass="entr" presetSubtype="0" fill="hold" grpId="0" nodeType="clickEffect">
-                                  <p:stCondLst>
-                                    <p:cond delay="0"/>
-                                  </p:stCondLst>
-                                  <p:childTnLst>
-                                    <p:set>
-                                      <p:cBhvr>
-                                        <p:cTn id="20" dur="1" fill="hold">
-                                          <p:stCondLst>
-                                            <p:cond delay="0"/>
-                                          </p:stCondLst>
-                                        </p:cTn>
-                                        <p:tgtEl>
-                                          <p:spTgt spid="27"/>
-                                        </p:tgtEl>
-                                        <p:attrNameLst>
-                                          <p:attrName>style.visibility</p:attrName>
-                                        </p:attrNameLst>
-                                      </p:cBhvr>
-                                      <p:to>
-                                        <p:strVal val="visible"/>
-                                      </p:to>
-                                    </p:set>
-                                    <p:animEffect transition="in" filter="fade">
-                                      <p:cBhvr>
-                                        <p:cTn id="21" dur="250"/>
-                                        <p:tgtEl>
-                                          <p:spTgt spid="27"/>
-                                        </p:tgtEl>
-                                      </p:cBhvr>
-                                    </p:animEffect>
-                                  </p:childTnLst>
-                                </p:cTn>
-                              </p:par>
-                              <p:par>
-                                <p:cTn id="22" presetID="10" presetClass="entr" presetSubtype="0" fill="hold" grpId="0" nodeType="withEffect">
-                                  <p:stCondLst>
-                                    <p:cond delay="0"/>
-                                  </p:stCondLst>
-                                  <p:childTnLst>
-                                    <p:set>
-                                      <p:cBhvr>
-                                        <p:cTn id="23" dur="1" fill="hold">
-                                          <p:stCondLst>
-                                            <p:cond delay="0"/>
-                                          </p:stCondLst>
-                                        </p:cTn>
-                                        <p:tgtEl>
-                                          <p:spTgt spid="30"/>
-                                        </p:tgtEl>
-                                        <p:attrNameLst>
-                                          <p:attrName>style.visibility</p:attrName>
-                                        </p:attrNameLst>
-                                      </p:cBhvr>
-                                      <p:to>
-                                        <p:strVal val="visible"/>
-                                      </p:to>
-                                    </p:set>
-                                    <p:animEffect transition="in" filter="fade">
-                                      <p:cBhvr>
-                                        <p:cTn id="24" dur="250"/>
-                                        <p:tgtEl>
-                                          <p:spTgt spid="30"/>
-                                        </p:tgtEl>
-                                      </p:cBhvr>
-                                    </p:animEffect>
-                                  </p:childTnLst>
-                                </p:cTn>
-                              </p:par>
-                            </p:childTnLst>
-                          </p:cTn>
-                        </p:par>
-                        <p:par>
-                          <p:cTn id="25" fill="hold">
-                            <p:stCondLst>
-                              <p:cond delay="250"/>
-                            </p:stCondLst>
-                            <p:childTnLst>
-                              <p:par>
-                                <p:cTn id="26" presetID="10" presetClass="entr" presetSubtype="0" fill="hold" nodeType="afterEffect">
-                                  <p:stCondLst>
-                                    <p:cond delay="0"/>
-                                  </p:stCondLst>
-                                  <p:childTnLst>
-                                    <p:set>
-                                      <p:cBhvr>
-                                        <p:cTn id="27" dur="1" fill="hold">
-                                          <p:stCondLst>
-                                            <p:cond delay="0"/>
-                                          </p:stCondLst>
-                                        </p:cTn>
-                                        <p:tgtEl>
-                                          <p:spTgt spid="18"/>
-                                        </p:tgtEl>
-                                        <p:attrNameLst>
-                                          <p:attrName>style.visibility</p:attrName>
-                                        </p:attrNameLst>
-                                      </p:cBhvr>
-                                      <p:to>
-                                        <p:strVal val="visible"/>
-                                      </p:to>
-                                    </p:set>
-                                    <p:animEffect transition="in" filter="fade">
-                                      <p:cBhvr>
-                                        <p:cTn id="28" dur="500"/>
-                                        <p:tgtEl>
-                                          <p:spTgt spid="18"/>
-                                        </p:tgtEl>
-                                      </p:cBhvr>
-                                    </p:animEffect>
-                                  </p:childTnLst>
-                                </p:cTn>
-                              </p:par>
-                            </p:childTnLst>
-                          </p:cTn>
-                        </p:par>
-                        <p:par>
-                          <p:cTn id="29" fill="hold">
-                            <p:stCondLst>
-                              <p:cond delay="750"/>
-                            </p:stCondLst>
-                            <p:childTnLst>
-                              <p:par>
-                                <p:cTn id="30" presetID="10" presetClass="entr" presetSubtype="0" fill="hold" nodeType="afterEffect">
-                                  <p:stCondLst>
-                                    <p:cond delay="0"/>
-                                  </p:stCondLst>
-                                  <p:childTnLst>
-                                    <p:set>
-                                      <p:cBhvr>
-                                        <p:cTn id="31" dur="1" fill="hold">
-                                          <p:stCondLst>
-                                            <p:cond delay="0"/>
-                                          </p:stCondLst>
-                                        </p:cTn>
-                                        <p:tgtEl>
-                                          <p:spTgt spid="12"/>
-                                        </p:tgtEl>
-                                        <p:attrNameLst>
-                                          <p:attrName>style.visibility</p:attrName>
-                                        </p:attrNameLst>
-                                      </p:cBhvr>
-                                      <p:to>
-                                        <p:strVal val="visible"/>
-                                      </p:to>
-                                    </p:set>
-                                    <p:animEffect transition="in" filter="fade">
-                                      <p:cBhvr>
-                                        <p:cTn id="32" dur="500"/>
-                                        <p:tgtEl>
-                                          <p:spTgt spid="12"/>
-                                        </p:tgtEl>
-                                      </p:cBhvr>
-                                    </p:animEffect>
-                                  </p:childTnLst>
-                                </p:cTn>
-                              </p:par>
-                              <p:par>
-                                <p:cTn id="33" presetID="10" presetClass="entr" presetSubtype="0" fill="hold" nodeType="withEffect">
-                                  <p:stCondLst>
-                                    <p:cond delay="0"/>
-                                  </p:stCondLst>
-                                  <p:childTnLst>
-                                    <p:set>
-                                      <p:cBhvr>
-                                        <p:cTn id="34" dur="1" fill="hold">
-                                          <p:stCondLst>
-                                            <p:cond delay="0"/>
-                                          </p:stCondLst>
-                                        </p:cTn>
-                                        <p:tgtEl>
-                                          <p:spTgt spid="13"/>
-                                        </p:tgtEl>
-                                        <p:attrNameLst>
-                                          <p:attrName>style.visibility</p:attrName>
-                                        </p:attrNameLst>
-                                      </p:cBhvr>
-                                      <p:to>
-                                        <p:strVal val="visible"/>
-                                      </p:to>
-                                    </p:set>
-                                    <p:animEffect transition="in" filter="fade">
-                                      <p:cBhvr>
-                                        <p:cTn id="35" dur="500"/>
-                                        <p:tgtEl>
-                                          <p:spTgt spid="13"/>
-                                        </p:tgtEl>
-                                      </p:cBhvr>
-                                    </p:animEffect>
-                                  </p:childTnLst>
-                                </p:cTn>
-                              </p:par>
-                              <p:par>
-                                <p:cTn id="36" presetID="10" presetClass="entr" presetSubtype="0" fill="hold" nodeType="withEffect">
-                                  <p:stCondLst>
-                                    <p:cond delay="0"/>
-                                  </p:stCondLst>
-                                  <p:childTnLst>
-                                    <p:set>
-                                      <p:cBhvr>
-                                        <p:cTn id="37" dur="1" fill="hold">
-                                          <p:stCondLst>
-                                            <p:cond delay="0"/>
-                                          </p:stCondLst>
-                                        </p:cTn>
-                                        <p:tgtEl>
-                                          <p:spTgt spid="14"/>
-                                        </p:tgtEl>
-                                        <p:attrNameLst>
-                                          <p:attrName>style.visibility</p:attrName>
-                                        </p:attrNameLst>
-                                      </p:cBhvr>
-                                      <p:to>
-                                        <p:strVal val="visible"/>
-                                      </p:to>
-                                    </p:set>
-                                    <p:animEffect transition="in" filter="fade">
-                                      <p:cBhvr>
-                                        <p:cTn id="38" dur="500"/>
-                                        <p:tgtEl>
-                                          <p:spTgt spid="14"/>
-                                        </p:tgtEl>
-                                      </p:cBhvr>
-                                    </p:animEffect>
-                                  </p:childTnLst>
-                                </p:cTn>
-                              </p:par>
-                              <p:par>
-                                <p:cTn id="39" presetID="10" presetClass="entr" presetSubtype="0" fill="hold" nodeType="withEffect">
-                                  <p:stCondLst>
-                                    <p:cond delay="0"/>
-                                  </p:stCondLst>
-                                  <p:childTnLst>
-                                    <p:set>
-                                      <p:cBhvr>
-                                        <p:cTn id="40" dur="1" fill="hold">
-                                          <p:stCondLst>
-                                            <p:cond delay="0"/>
-                                          </p:stCondLst>
-                                        </p:cTn>
-                                        <p:tgtEl>
-                                          <p:spTgt spid="15"/>
-                                        </p:tgtEl>
-                                        <p:attrNameLst>
-                                          <p:attrName>style.visibility</p:attrName>
-                                        </p:attrNameLst>
-                                      </p:cBhvr>
-                                      <p:to>
-                                        <p:strVal val="visible"/>
-                                      </p:to>
-                                    </p:set>
-                                    <p:animEffect transition="in" filter="fade">
-                                      <p:cBhvr>
-                                        <p:cTn id="41" dur="500"/>
-                                        <p:tgtEl>
-                                          <p:spTgt spid="15"/>
-                                        </p:tgtEl>
-                                      </p:cBhvr>
-                                    </p:animEffect>
-                                  </p:childTnLst>
-                                </p:cTn>
-                              </p:par>
-                              <p:par>
-                                <p:cTn id="42" presetID="10" presetClass="entr" presetSubtype="0" fill="hold" nodeType="withEffect">
-                                  <p:stCondLst>
-                                    <p:cond delay="0"/>
-                                  </p:stCondLst>
-                                  <p:childTnLst>
-                                    <p:set>
-                                      <p:cBhvr>
-                                        <p:cTn id="43" dur="1" fill="hold">
-                                          <p:stCondLst>
-                                            <p:cond delay="0"/>
-                                          </p:stCondLst>
-                                        </p:cTn>
-                                        <p:tgtEl>
-                                          <p:spTgt spid="16"/>
-                                        </p:tgtEl>
-                                        <p:attrNameLst>
-                                          <p:attrName>style.visibility</p:attrName>
-                                        </p:attrNameLst>
-                                      </p:cBhvr>
-                                      <p:to>
-                                        <p:strVal val="visible"/>
-                                      </p:to>
-                                    </p:set>
-                                    <p:animEffect transition="in" filter="fade">
-                                      <p:cBhvr>
-                                        <p:cTn id="44" dur="500"/>
-                                        <p:tgtEl>
-                                          <p:spTgt spid="16"/>
-                                        </p:tgtEl>
-                                      </p:cBhvr>
-                                    </p:animEffect>
-                                  </p:childTnLst>
-                                </p:cTn>
-                              </p:par>
-                            </p:childTnLst>
-                          </p:cTn>
-                        </p:par>
-                        <p:par>
-                          <p:cTn id="45" fill="hold">
-                            <p:stCondLst>
-                              <p:cond delay="1250"/>
-                            </p:stCondLst>
-                            <p:childTnLst>
-                              <p:par>
-                                <p:cTn id="46" presetID="10" presetClass="entr" presetSubtype="0" fill="hold" grpId="1" nodeType="afterEffect">
-                                  <p:stCondLst>
-                                    <p:cond delay="0"/>
-                                  </p:stCondLst>
-                                  <p:childTnLst>
-                                    <p:set>
-                                      <p:cBhvr>
-                                        <p:cTn id="47" dur="1" fill="hold">
-                                          <p:stCondLst>
-                                            <p:cond delay="0"/>
-                                          </p:stCondLst>
-                                        </p:cTn>
-                                        <p:tgtEl>
-                                          <p:spTgt spid="2"/>
-                                        </p:tgtEl>
-                                        <p:attrNameLst>
-                                          <p:attrName>style.visibility</p:attrName>
-                                        </p:attrNameLst>
-                                      </p:cBhvr>
-                                      <p:to>
-                                        <p:strVal val="visible"/>
-                                      </p:to>
-                                    </p:set>
-                                    <p:animEffect transition="in" filter="fade">
-                                      <p:cBhvr>
-                                        <p:cTn id="48" dur="500"/>
-                                        <p:tgtEl>
-                                          <p:spTgt spid="2"/>
-                                        </p:tgtEl>
-                                      </p:cBhvr>
-                                    </p:animEffect>
-                                  </p:childTnLst>
-                                </p:cTn>
-                              </p:par>
-                            </p:childTnLst>
-                          </p:cTn>
-                        </p:par>
-                        <p:par>
-                          <p:cTn id="49" fill="hold">
-                            <p:stCondLst>
-                              <p:cond delay="1750"/>
-                            </p:stCondLst>
-                            <p:childTnLst>
-                              <p:par>
-                                <p:cTn id="50" presetID="10" presetClass="entr" presetSubtype="0" fill="hold" grpId="1" nodeType="afterEffect">
-                                  <p:stCondLst>
-                                    <p:cond delay="0"/>
-                                  </p:stCondLst>
-                                  <p:childTnLst>
-                                    <p:set>
-                                      <p:cBhvr>
-                                        <p:cTn id="51" dur="1" fill="hold">
-                                          <p:stCondLst>
-                                            <p:cond delay="0"/>
-                                          </p:stCondLst>
-                                        </p:cTn>
-                                        <p:tgtEl>
-                                          <p:spTgt spid="4"/>
-                                        </p:tgtEl>
-                                        <p:attrNameLst>
-                                          <p:attrName>style.visibility</p:attrName>
-                                        </p:attrNameLst>
-                                      </p:cBhvr>
-                                      <p:to>
-                                        <p:strVal val="visible"/>
-                                      </p:to>
-                                    </p:set>
-                                    <p:animEffect transition="in" filter="fade">
-                                      <p:cBhvr>
-                                        <p:cTn id="52" dur="500"/>
-                                        <p:tgtEl>
-                                          <p:spTgt spid="4"/>
-                                        </p:tgtEl>
-                                      </p:cBhvr>
-                                    </p:animEffect>
-                                  </p:childTnLst>
-                                </p:cTn>
-                              </p:par>
-                            </p:childTnLst>
-                          </p:cTn>
-                        </p:par>
-                      </p:childTnLst>
-                    </p:cTn>
-                  </p:par>
-                  <p:par>
-                    <p:cTn id="53" fill="hold">
-                      <p:stCondLst>
-                        <p:cond delay="indefinite"/>
-                      </p:stCondLst>
-                      <p:childTnLst>
-                        <p:par>
-                          <p:cTn id="54" fill="hold">
-                            <p:stCondLst>
-                              <p:cond delay="0"/>
-                            </p:stCondLst>
-                            <p:childTnLst>
-                              <p:par>
-                                <p:cTn id="55" presetID="3" presetClass="emph" presetSubtype="2" fill="hold" grpId="0" nodeType="clickEffect">
-                                  <p:stCondLst>
-                                    <p:cond delay="0"/>
-                                  </p:stCondLst>
-                                  <p:childTnLst>
-                                    <p:animClr clrSpc="rgb" dir="cw">
-                                      <p:cBhvr override="childStyle">
-                                        <p:cTn id="56" dur="500" fill="hold"/>
-                                        <p:tgtEl>
-                                          <p:spTgt spid="2"/>
-                                        </p:tgtEl>
-                                        <p:attrNameLst>
-                                          <p:attrName>style.color</p:attrName>
-                                        </p:attrNameLst>
-                                      </p:cBhvr>
-                                      <p:to>
-                                        <a:srgbClr val="CC0000"/>
-                                      </p:to>
-                                    </p:animClr>
-                                  </p:childTnLst>
-                                </p:cTn>
-                              </p:par>
-                              <p:par>
-                                <p:cTn id="57" presetID="7" presetClass="emph" presetSubtype="2" fill="hold" nodeType="withEffect">
-                                  <p:stCondLst>
-                                    <p:cond delay="0"/>
-                                  </p:stCondLst>
-                                  <p:childTnLst>
-                                    <p:animClr clrSpc="rgb" dir="cw">
-                                      <p:cBhvr>
-                                        <p:cTn id="58" dur="500" fill="hold"/>
-                                        <p:tgtEl>
-                                          <p:spTgt spid="12"/>
-                                        </p:tgtEl>
-                                        <p:attrNameLst>
-                                          <p:attrName>stroke.color</p:attrName>
-                                        </p:attrNameLst>
-                                      </p:cBhvr>
-                                      <p:to>
-                                        <a:srgbClr val="CC0000"/>
-                                      </p:to>
-                                    </p:animClr>
-                                    <p:set>
-                                      <p:cBhvr>
-                                        <p:cTn id="59" dur="500" fill="hold"/>
-                                        <p:tgtEl>
-                                          <p:spTgt spid="12"/>
-                                        </p:tgtEl>
-                                        <p:attrNameLst>
-                                          <p:attrName>stroke.on</p:attrName>
-                                        </p:attrNameLst>
-                                      </p:cBhvr>
-                                      <p:to>
-                                        <p:strVal val="true"/>
-                                      </p:to>
-                                    </p:set>
-                                  </p:childTnLst>
-                                </p:cTn>
-                              </p:par>
-                              <p:par>
-                                <p:cTn id="60" presetID="7" presetClass="emph" presetSubtype="2" fill="hold" nodeType="withEffect">
-                                  <p:stCondLst>
-                                    <p:cond delay="0"/>
-                                  </p:stCondLst>
-                                  <p:childTnLst>
-                                    <p:animClr clrSpc="rgb" dir="cw">
-                                      <p:cBhvr>
-                                        <p:cTn id="61" dur="500" fill="hold"/>
-                                        <p:tgtEl>
-                                          <p:spTgt spid="13"/>
-                                        </p:tgtEl>
-                                        <p:attrNameLst>
-                                          <p:attrName>stroke.color</p:attrName>
-                                        </p:attrNameLst>
-                                      </p:cBhvr>
-                                      <p:to>
-                                        <a:srgbClr val="CC0000"/>
-                                      </p:to>
-                                    </p:animClr>
-                                    <p:set>
-                                      <p:cBhvr>
-                                        <p:cTn id="62" dur="500" fill="hold"/>
-                                        <p:tgtEl>
-                                          <p:spTgt spid="13"/>
-                                        </p:tgtEl>
-                                        <p:attrNameLst>
-                                          <p:attrName>stroke.on</p:attrName>
-                                        </p:attrNameLst>
-                                      </p:cBhvr>
-                                      <p:to>
-                                        <p:strVal val="true"/>
-                                      </p:to>
-                                    </p:set>
-                                  </p:childTnLst>
-                                </p:cTn>
-                              </p:par>
-                              <p:par>
-                                <p:cTn id="63" presetID="7" presetClass="emph" presetSubtype="2" fill="hold" nodeType="withEffect">
-                                  <p:stCondLst>
-                                    <p:cond delay="0"/>
-                                  </p:stCondLst>
-                                  <p:childTnLst>
-                                    <p:animClr clrSpc="rgb" dir="cw">
-                                      <p:cBhvr>
-                                        <p:cTn id="64" dur="500" fill="hold"/>
-                                        <p:tgtEl>
-                                          <p:spTgt spid="14"/>
-                                        </p:tgtEl>
-                                        <p:attrNameLst>
-                                          <p:attrName>stroke.color</p:attrName>
-                                        </p:attrNameLst>
-                                      </p:cBhvr>
-                                      <p:to>
-                                        <a:srgbClr val="CC0000"/>
-                                      </p:to>
-                                    </p:animClr>
-                                    <p:set>
-                                      <p:cBhvr>
-                                        <p:cTn id="65" dur="500" fill="hold"/>
-                                        <p:tgtEl>
-                                          <p:spTgt spid="14"/>
-                                        </p:tgtEl>
-                                        <p:attrNameLst>
-                                          <p:attrName>stroke.on</p:attrName>
-                                        </p:attrNameLst>
-                                      </p:cBhvr>
-                                      <p:to>
-                                        <p:strVal val="true"/>
-                                      </p:to>
-                                    </p:set>
-                                  </p:childTnLst>
-                                </p:cTn>
-                              </p:par>
-                              <p:par>
-                                <p:cTn id="66" presetID="7" presetClass="emph" presetSubtype="2" fill="hold" nodeType="withEffect">
-                                  <p:stCondLst>
-                                    <p:cond delay="0"/>
-                                  </p:stCondLst>
-                                  <p:childTnLst>
-                                    <p:animClr clrSpc="rgb" dir="cw">
-                                      <p:cBhvr>
-                                        <p:cTn id="67" dur="500" fill="hold"/>
-                                        <p:tgtEl>
-                                          <p:spTgt spid="15"/>
-                                        </p:tgtEl>
-                                        <p:attrNameLst>
-                                          <p:attrName>stroke.color</p:attrName>
-                                        </p:attrNameLst>
-                                      </p:cBhvr>
-                                      <p:to>
-                                        <a:srgbClr val="CC0000"/>
-                                      </p:to>
-                                    </p:animClr>
-                                    <p:set>
-                                      <p:cBhvr>
-                                        <p:cTn id="68" dur="500" fill="hold"/>
-                                        <p:tgtEl>
-                                          <p:spTgt spid="15"/>
-                                        </p:tgtEl>
-                                        <p:attrNameLst>
-                                          <p:attrName>stroke.on</p:attrName>
-                                        </p:attrNameLst>
-                                      </p:cBhvr>
-                                      <p:to>
-                                        <p:strVal val="true"/>
-                                      </p:to>
-                                    </p:set>
-                                  </p:childTnLst>
-                                </p:cTn>
-                              </p:par>
-                              <p:par>
-                                <p:cTn id="69" presetID="7" presetClass="emph" presetSubtype="2" fill="hold" nodeType="withEffect">
-                                  <p:stCondLst>
-                                    <p:cond delay="0"/>
-                                  </p:stCondLst>
-                                  <p:childTnLst>
-                                    <p:animClr clrSpc="rgb" dir="cw">
-                                      <p:cBhvr>
-                                        <p:cTn id="70" dur="500" fill="hold"/>
-                                        <p:tgtEl>
-                                          <p:spTgt spid="16"/>
-                                        </p:tgtEl>
-                                        <p:attrNameLst>
-                                          <p:attrName>stroke.color</p:attrName>
-                                        </p:attrNameLst>
-                                      </p:cBhvr>
-                                      <p:to>
-                                        <a:srgbClr val="CC0000"/>
-                                      </p:to>
-                                    </p:animClr>
-                                    <p:set>
-                                      <p:cBhvr>
-                                        <p:cTn id="71" dur="500" fill="hold"/>
-                                        <p:tgtEl>
-                                          <p:spTgt spid="16"/>
-                                        </p:tgtEl>
-                                        <p:attrNameLst>
-                                          <p:attrName>stroke.on</p:attrName>
-                                        </p:attrNameLst>
-                                      </p:cBhvr>
-                                      <p:to>
-                                        <p:strVal val="true"/>
-                                      </p:to>
-                                    </p:set>
-                                  </p:childTnLst>
-                                </p:cTn>
-                              </p:par>
-                            </p:childTnLst>
-                          </p:cTn>
-                        </p:par>
-                      </p:childTnLst>
-                    </p:cTn>
-                  </p:par>
-                  <p:par>
-                    <p:cTn id="72" fill="hold">
-                      <p:stCondLst>
-                        <p:cond delay="indefinite"/>
-                      </p:stCondLst>
-                      <p:childTnLst>
-                        <p:par>
-                          <p:cTn id="73" fill="hold">
-                            <p:stCondLst>
-                              <p:cond delay="0"/>
-                            </p:stCondLst>
-                            <p:childTnLst>
-                              <p:par>
-                                <p:cTn id="74" presetID="3" presetClass="emph" presetSubtype="2" fill="hold" grpId="0" nodeType="clickEffect">
-                                  <p:stCondLst>
-                                    <p:cond delay="0"/>
-                                  </p:stCondLst>
-                                  <p:childTnLst>
-                                    <p:animClr clrSpc="rgb" dir="cw">
-                                      <p:cBhvr override="childStyle">
-                                        <p:cTn id="75" dur="500" fill="hold"/>
-                                        <p:tgtEl>
-                                          <p:spTgt spid="4"/>
-                                        </p:tgtEl>
-                                        <p:attrNameLst>
-                                          <p:attrName>style.color</p:attrName>
-                                        </p:attrNameLst>
-                                      </p:cBhvr>
-                                      <p:to>
-                                        <a:srgbClr val="800080"/>
-                                      </p:to>
-                                    </p:animClr>
-                                  </p:childTnLst>
-                                </p:cTn>
-                              </p:par>
-                              <p:par>
-                                <p:cTn id="76" presetID="10" presetClass="entr" presetSubtype="0" fill="hold" nodeType="withEffect">
-                                  <p:stCondLst>
-                                    <p:cond delay="0"/>
-                                  </p:stCondLst>
-                                  <p:childTnLst>
-                                    <p:set>
-                                      <p:cBhvr>
-                                        <p:cTn id="77" dur="1" fill="hold">
-                                          <p:stCondLst>
-                                            <p:cond delay="0"/>
-                                          </p:stCondLst>
-                                        </p:cTn>
-                                        <p:tgtEl>
-                                          <p:spTgt spid="21"/>
-                                        </p:tgtEl>
-                                        <p:attrNameLst>
-                                          <p:attrName>style.visibility</p:attrName>
-                                        </p:attrNameLst>
-                                      </p:cBhvr>
-                                      <p:to>
-                                        <p:strVal val="visible"/>
-                                      </p:to>
-                                    </p:set>
-                                    <p:animEffect transition="in" filter="fade">
-                                      <p:cBhvr>
-                                        <p:cTn id="78" dur="500"/>
-                                        <p:tgtEl>
-                                          <p:spTgt spid="21"/>
-                                        </p:tgtEl>
-                                      </p:cBhvr>
-                                    </p:animEffect>
-                                  </p:childTnLst>
-                                </p:cTn>
-                              </p:par>
-                            </p:childTnLst>
-                          </p:cTn>
-                        </p:par>
-                      </p:childTnLst>
-                    </p:cTn>
-                  </p:par>
-                </p:childTnLst>
-              </p:cTn>
-              <p:prevCondLst>
-                <p:cond evt="onPrev" delay="0">
-                  <p:tgtEl>
-                    <p:sldTgt/>
-                  </p:tgtEl>
-                </p:cond>
-              </p:prevCondLst>
-              <p:nextCondLst>
-                <p:cond evt="onNext" delay="0">
-                  <p:tgtEl>
-                    <p:sldTgt/>
-                  </p:tgtEl>
-                </p:cond>
-              </p:nextCondLst>
-            </p:seq>
-          </p:childTnLst>
-        </p:cTn>
-      </p:par>
-    </p:tnLst>
-    <p:bldLst>
-      <p:bldP spid="27" grpId="0" animBg="1"/>
-      <p:bldP spid="28" grpId="0" animBg="1"/>
-      <p:bldP spid="29" grpId="0"/>
-      <p:bldP spid="30" grpId="0"/>
-      <p:bldP spid="2" grpId="0"/>
-      <p:bldP spid="2" grpId="1"/>
-      <p:bldP spid="4" grpId="0"/>
-      <p:bldP spid="4" grpId="1"/>
-    </p:bldLst>
-  </p:timing>
-</p:sld>
-</file>
-
-<file path=ppt/slides/slide5.xml><?xml version="1.0" encoding="utf-8"?>
 <p:sld xmlns:a="http://schemas.openxmlformats.org/drawingml/2006/main" xmlns:r="http://schemas.openxmlformats.org/officeDocument/2006/relationships" xmlns:p="http://schemas.openxmlformats.org/presentationml/2006/main">
   <p:cSld>
     <p:spTree>
@@ -8144,7 +6212,7 @@
 </p:sld>
 </file>
 
-<file path=ppt/slides/slide6.xml><?xml version="1.0" encoding="utf-8"?>
+<file path=ppt/slides/slide4.xml><?xml version="1.0" encoding="utf-8"?>
 <p:sld xmlns:a="http://schemas.openxmlformats.org/drawingml/2006/main" xmlns:r="http://schemas.openxmlformats.org/officeDocument/2006/relationships" xmlns:p="http://schemas.openxmlformats.org/presentationml/2006/main">
   <p:cSld>
     <p:spTree>
@@ -8831,6 +6899,9 @@
                     <p:cTn id="3" fill="hold">
                       <p:stCondLst>
                         <p:cond delay="indefinite"/>
+                        <p:cond evt="onBegin" delay="0">
+                          <p:tn val="2"/>
+                        </p:cond>
                       </p:stCondLst>
                       <p:childTnLst>
                         <p:par>
@@ -8840,7 +6911,7 @@
                             </p:stCondLst>
                             <p:childTnLst>
                               <p:par>
-                                <p:cTn id="5" presetID="6" presetClass="emph" presetSubtype="0" fill="hold" nodeType="clickEffect">
+                                <p:cTn id="5" presetID="6" presetClass="emph" presetSubtype="0" fill="hold" nodeType="withEffect">
                                   <p:stCondLst>
                                     <p:cond delay="0"/>
                                   </p:stCondLst>

</xml_diff>

<commit_message>
light blue backgound outro slide (poster theme)
</commit_message>
<xml_diff>
--- a/alternative slides.pptx
+++ b/alternative slides.pptx
@@ -5,13 +5,14 @@
     <p:sldMasterId id="2147483648" r:id="rId1"/>
   </p:sldMasterIdLst>
   <p:notesMasterIdLst>
-    <p:notesMasterId r:id="rId6"/>
+    <p:notesMasterId r:id="rId7"/>
   </p:notesMasterIdLst>
   <p:sldIdLst>
     <p:sldId id="298" r:id="rId2"/>
     <p:sldId id="296" r:id="rId3"/>
     <p:sldId id="297" r:id="rId4"/>
     <p:sldId id="299" r:id="rId5"/>
+    <p:sldId id="330" r:id="rId6"/>
   </p:sldIdLst>
   <p:sldSz cx="12192000" cy="6858000"/>
   <p:notesSz cx="6858000" cy="9144000"/>
@@ -465,6 +466,90 @@
     </a:lvl9pPr>
   </p:notesStyle>
 </p:notesMaster>
+</file>
+
+<file path=ppt/notesSlides/notesSlide1.xml><?xml version="1.0" encoding="utf-8"?>
+<p:notes xmlns:a="http://schemas.openxmlformats.org/drawingml/2006/main" xmlns:r="http://schemas.openxmlformats.org/officeDocument/2006/relationships" xmlns:p="http://schemas.openxmlformats.org/presentationml/2006/main">
+  <p:cSld>
+    <p:spTree>
+      <p:nvGrpSpPr>
+        <p:cNvPr id="1" name=""/>
+        <p:cNvGrpSpPr/>
+        <p:nvPr/>
+      </p:nvGrpSpPr>
+      <p:grpSpPr>
+        <a:xfrm>
+          <a:off x="0" y="0"/>
+          <a:ext cx="0" cy="0"/>
+          <a:chOff x="0" y="0"/>
+          <a:chExt cx="0" cy="0"/>
+        </a:xfrm>
+      </p:grpSpPr>
+      <p:sp>
+        <p:nvSpPr>
+          <p:cNvPr id="2" name="Espace réservé de l'image des diapositives 1"/>
+          <p:cNvSpPr>
+            <a:spLocks noGrp="1" noRot="1" noChangeAspect="1"/>
+          </p:cNvSpPr>
+          <p:nvPr>
+            <p:ph type="sldImg"/>
+          </p:nvPr>
+        </p:nvSpPr>
+        <p:spPr/>
+      </p:sp>
+      <p:sp>
+        <p:nvSpPr>
+          <p:cNvPr id="3" name="Espace réservé des notes 2"/>
+          <p:cNvSpPr>
+            <a:spLocks noGrp="1"/>
+          </p:cNvSpPr>
+          <p:nvPr>
+            <p:ph type="body" idx="1"/>
+          </p:nvPr>
+        </p:nvSpPr>
+        <p:spPr/>
+        <p:txBody>
+          <a:bodyPr/>
+          <a:lstStyle/>
+          <a:p>
+            <a:endParaRPr lang="fr-FR" dirty="0"/>
+          </a:p>
+        </p:txBody>
+      </p:sp>
+      <p:sp>
+        <p:nvSpPr>
+          <p:cNvPr id="4" name="Espace réservé du numéro de diapositive 3"/>
+          <p:cNvSpPr>
+            <a:spLocks noGrp="1"/>
+          </p:cNvSpPr>
+          <p:nvPr>
+            <p:ph type="sldNum" sz="quarter" idx="5"/>
+          </p:nvPr>
+        </p:nvSpPr>
+        <p:spPr/>
+        <p:txBody>
+          <a:bodyPr/>
+          <a:lstStyle/>
+          <a:p>
+            <a:fld id="{E39F5141-A6F4-4858-952A-002C4D3D11D6}" type="slidenum">
+              <a:rPr lang="fr-FR" smtClean="0"/>
+              <a:t>5</a:t>
+            </a:fld>
+            <a:endParaRPr lang="fr-FR"/>
+          </a:p>
+        </p:txBody>
+      </p:sp>
+    </p:spTree>
+    <p:extLst>
+      <p:ext uri="{BB962C8B-B14F-4D97-AF65-F5344CB8AC3E}">
+        <p14:creationId xmlns:p14="http://schemas.microsoft.com/office/powerpoint/2010/main" val="3623220598"/>
+      </p:ext>
+    </p:extLst>
+  </p:cSld>
+  <p:clrMapOvr>
+    <a:masterClrMapping/>
+  </p:clrMapOvr>
+</p:notes>
 </file>
 
 <file path=ppt/slideLayouts/slideLayout1.xml><?xml version="1.0" encoding="utf-8"?>
@@ -7780,6 +7865,559 @@
       <p:bldP spid="2" grpId="1"/>
       <p:bldP spid="4" grpId="0"/>
       <p:bldP spid="4" grpId="1"/>
+    </p:bldLst>
+  </p:timing>
+</p:sld>
+</file>
+
+<file path=ppt/slides/slide5.xml><?xml version="1.0" encoding="utf-8"?>
+<p:sld xmlns:a="http://schemas.openxmlformats.org/drawingml/2006/main" xmlns:r="http://schemas.openxmlformats.org/officeDocument/2006/relationships" xmlns:p="http://schemas.openxmlformats.org/presentationml/2006/main">
+  <p:cSld>
+    <p:spTree>
+      <p:nvGrpSpPr>
+        <p:cNvPr id="1" name=""/>
+        <p:cNvGrpSpPr/>
+        <p:nvPr/>
+      </p:nvGrpSpPr>
+      <p:grpSpPr>
+        <a:xfrm>
+          <a:off x="0" y="0"/>
+          <a:ext cx="0" cy="0"/>
+          <a:chOff x="0" y="0"/>
+          <a:chExt cx="0" cy="0"/>
+        </a:xfrm>
+      </p:grpSpPr>
+      <p:sp>
+        <p:nvSpPr>
+          <p:cNvPr id="2" name="Rectangle 1">
+            <a:extLst>
+              <a:ext uri="{FF2B5EF4-FFF2-40B4-BE49-F238E27FC236}">
+                <a16:creationId xmlns:a16="http://schemas.microsoft.com/office/drawing/2014/main" id="{91A707A6-8928-2380-EAA0-77204446ACB4}"/>
+              </a:ext>
+            </a:extLst>
+          </p:cNvPr>
+          <p:cNvSpPr/>
+          <p:nvPr/>
+        </p:nvSpPr>
+        <p:spPr>
+          <a:xfrm>
+            <a:off x="0" y="0"/>
+            <a:ext cx="12192000" cy="6858000"/>
+          </a:xfrm>
+          <a:prstGeom prst="rect">
+            <a:avLst/>
+          </a:prstGeom>
+          <a:solidFill>
+            <a:srgbClr val="8FDBDA"/>
+          </a:solidFill>
+          <a:ln>
+            <a:noFill/>
+          </a:ln>
+        </p:spPr>
+        <p:style>
+          <a:lnRef idx="2">
+            <a:schemeClr val="accent1">
+              <a:shade val="50000"/>
+            </a:schemeClr>
+          </a:lnRef>
+          <a:fillRef idx="1">
+            <a:schemeClr val="accent1"/>
+          </a:fillRef>
+          <a:effectRef idx="0">
+            <a:schemeClr val="accent1"/>
+          </a:effectRef>
+          <a:fontRef idx="minor">
+            <a:schemeClr val="lt1"/>
+          </a:fontRef>
+        </p:style>
+        <p:txBody>
+          <a:bodyPr rtlCol="0" anchor="ctr"/>
+          <a:lstStyle/>
+          <a:p>
+            <a:pPr algn="ctr"/>
+            <a:endParaRPr lang="fr-FR"/>
+          </a:p>
+        </p:txBody>
+      </p:sp>
+      <p:pic>
+        <p:nvPicPr>
+          <p:cNvPr id="15" name="Graphique 14">
+            <a:extLst>
+              <a:ext uri="{FF2B5EF4-FFF2-40B4-BE49-F238E27FC236}">
+                <a16:creationId xmlns:a16="http://schemas.microsoft.com/office/drawing/2014/main" id="{A6C912F2-20D5-37BE-F35D-A06B15B7F33F}"/>
+              </a:ext>
+            </a:extLst>
+          </p:cNvPr>
+          <p:cNvPicPr>
+            <a:picLocks noChangeAspect="1"/>
+          </p:cNvPicPr>
+          <p:nvPr/>
+        </p:nvPicPr>
+        <p:blipFill>
+          <a:blip r:embed="rId3">
+            <a:extLst>
+              <a:ext uri="{28A0092B-C50C-407E-A947-70E740481C1C}">
+                <a14:useLocalDpi xmlns:a14="http://schemas.microsoft.com/office/drawing/2010/main" val="0"/>
+              </a:ext>
+              <a:ext uri="{96DAC541-7B7A-43D3-8B79-37D633B846F1}">
+                <asvg:svgBlip xmlns:asvg="http://schemas.microsoft.com/office/drawing/2016/SVG/main" r:embed="rId4"/>
+              </a:ext>
+            </a:extLst>
+          </a:blip>
+          <a:stretch>
+            <a:fillRect/>
+          </a:stretch>
+        </p:blipFill>
+        <p:spPr>
+          <a:xfrm>
+            <a:off x="4342375" y="1495273"/>
+            <a:ext cx="6629400" cy="4972050"/>
+          </a:xfrm>
+          <a:prstGeom prst="rect">
+            <a:avLst/>
+          </a:prstGeom>
+        </p:spPr>
+      </p:pic>
+      <p:sp>
+        <p:nvSpPr>
+          <p:cNvPr id="3" name="Titre 2">
+            <a:extLst>
+              <a:ext uri="{FF2B5EF4-FFF2-40B4-BE49-F238E27FC236}">
+                <a16:creationId xmlns:a16="http://schemas.microsoft.com/office/drawing/2014/main" id="{0A649572-FD28-771C-4923-A554EFF07685}"/>
+              </a:ext>
+            </a:extLst>
+          </p:cNvPr>
+          <p:cNvSpPr>
+            <a:spLocks noGrp="1"/>
+          </p:cNvSpPr>
+          <p:nvPr>
+            <p:ph type="title"/>
+          </p:nvPr>
+        </p:nvSpPr>
+        <p:spPr>
+          <a:xfrm>
+            <a:off x="838200" y="1"/>
+            <a:ext cx="10515600" cy="1885950"/>
+          </a:xfrm>
+        </p:spPr>
+        <p:txBody>
+          <a:bodyPr>
+            <a:normAutofit fontScale="90000"/>
+          </a:bodyPr>
+          <a:lstStyle/>
+          <a:p>
+            <a:pPr algn="ctr"/>
+            <a:r>
+              <a:rPr lang="fr-FR" dirty="0">
+                <a:solidFill>
+                  <a:schemeClr val="bg1"/>
+                </a:solidFill>
+              </a:rPr>
+              <a:t>CRYPTOGRAPHIE ASYMETRIQUE:</a:t>
+            </a:r>
+            <a:br>
+              <a:rPr lang="fr-FR" dirty="0">
+                <a:solidFill>
+                  <a:schemeClr val="bg1"/>
+                </a:solidFill>
+              </a:rPr>
+            </a:br>
+            <a:r>
+              <a:rPr lang="fr-FR" b="1" dirty="0">
+                <a:solidFill>
+                  <a:schemeClr val="bg1"/>
+                </a:solidFill>
+              </a:rPr>
+              <a:t>Ou comment envoyer un secret </a:t>
+            </a:r>
+            <a:br>
+              <a:rPr lang="fr-FR" b="1" dirty="0">
+                <a:solidFill>
+                  <a:schemeClr val="bg1"/>
+                </a:solidFill>
+              </a:rPr>
+            </a:br>
+            <a:r>
+              <a:rPr lang="fr-FR" b="1" dirty="0">
+                <a:solidFill>
+                  <a:schemeClr val="bg1"/>
+                </a:solidFill>
+              </a:rPr>
+              <a:t>avec un haut-parleur?</a:t>
+            </a:r>
+          </a:p>
+        </p:txBody>
+      </p:sp>
+      <p:sp>
+        <p:nvSpPr>
+          <p:cNvPr id="4" name="Titre 2">
+            <a:extLst>
+              <a:ext uri="{FF2B5EF4-FFF2-40B4-BE49-F238E27FC236}">
+                <a16:creationId xmlns:a16="http://schemas.microsoft.com/office/drawing/2014/main" id="{994DAC38-8919-844B-3BF7-4C8CEB6A2444}"/>
+              </a:ext>
+            </a:extLst>
+          </p:cNvPr>
+          <p:cNvSpPr txBox="1">
+            <a:spLocks/>
+          </p:cNvSpPr>
+          <p:nvPr/>
+        </p:nvSpPr>
+        <p:spPr>
+          <a:xfrm>
+            <a:off x="9178725" y="5997616"/>
+            <a:ext cx="3013275" cy="356884"/>
+          </a:xfrm>
+          <a:prstGeom prst="rect">
+            <a:avLst/>
+          </a:prstGeom>
+        </p:spPr>
+        <p:txBody>
+          <a:bodyPr vert="horz" lIns="91440" tIns="45720" rIns="91440" bIns="45720" rtlCol="0" anchor="ctr">
+            <a:normAutofit fontScale="97500" lnSpcReduction="10000"/>
+          </a:bodyPr>
+          <a:lstStyle>
+            <a:lvl1pPr algn="l" defTabSz="914400" rtl="0" eaLnBrk="1" latinLnBrk="0" hangingPunct="1">
+              <a:lnSpc>
+                <a:spcPct val="90000"/>
+              </a:lnSpc>
+              <a:spcBef>
+                <a:spcPct val="0"/>
+              </a:spcBef>
+              <a:buNone/>
+              <a:defRPr sz="4400" kern="1200">
+                <a:solidFill>
+                  <a:schemeClr val="tx1"/>
+                </a:solidFill>
+                <a:latin typeface="+mj-lt"/>
+                <a:ea typeface="+mj-ea"/>
+                <a:cs typeface="+mj-cs"/>
+              </a:defRPr>
+            </a:lvl1pPr>
+          </a:lstStyle>
+          <a:p>
+            <a:pPr algn="r"/>
+            <a:r>
+              <a:rPr lang="fr-FR" sz="2200" dirty="0">
+                <a:solidFill>
+                  <a:schemeClr val="bg1"/>
+                </a:solidFill>
+                <a:latin typeface="+mn-lt"/>
+              </a:rPr>
+              <a:t>Présenté par Paul DUBOIS</a:t>
+            </a:r>
+          </a:p>
+        </p:txBody>
+      </p:sp>
+      <p:sp>
+        <p:nvSpPr>
+          <p:cNvPr id="5" name="Titre 2">
+            <a:extLst>
+              <a:ext uri="{FF2B5EF4-FFF2-40B4-BE49-F238E27FC236}">
+                <a16:creationId xmlns:a16="http://schemas.microsoft.com/office/drawing/2014/main" id="{458BA7D4-0899-7E93-BD21-D7C6FBD0D6C2}"/>
+              </a:ext>
+            </a:extLst>
+          </p:cNvPr>
+          <p:cNvSpPr txBox="1">
+            <a:spLocks/>
+          </p:cNvSpPr>
+          <p:nvPr/>
+        </p:nvSpPr>
+        <p:spPr>
+          <a:xfrm>
+            <a:off x="8469218" y="6354501"/>
+            <a:ext cx="3722782" cy="503500"/>
+          </a:xfrm>
+          <a:prstGeom prst="rect">
+            <a:avLst/>
+          </a:prstGeom>
+        </p:spPr>
+        <p:txBody>
+          <a:bodyPr vert="horz" lIns="91440" tIns="45720" rIns="91440" bIns="45720" rtlCol="0" anchor="ctr">
+            <a:normAutofit fontScale="97500"/>
+          </a:bodyPr>
+          <a:lstStyle>
+            <a:lvl1pPr algn="l" defTabSz="914400" rtl="0" eaLnBrk="1" latinLnBrk="0" hangingPunct="1">
+              <a:lnSpc>
+                <a:spcPct val="90000"/>
+              </a:lnSpc>
+              <a:spcBef>
+                <a:spcPct val="0"/>
+              </a:spcBef>
+              <a:buNone/>
+              <a:defRPr sz="4400" kern="1200">
+                <a:solidFill>
+                  <a:schemeClr val="tx1"/>
+                </a:solidFill>
+                <a:latin typeface="+mj-lt"/>
+                <a:ea typeface="+mj-ea"/>
+                <a:cs typeface="+mj-cs"/>
+              </a:defRPr>
+            </a:lvl1pPr>
+          </a:lstStyle>
+          <a:p>
+            <a:pPr algn="r"/>
+            <a:r>
+              <a:rPr lang="fr-FR" sz="2800" b="1" dirty="0">
+                <a:solidFill>
+                  <a:schemeClr val="bg1"/>
+                </a:solidFill>
+                <a:latin typeface="+mn-lt"/>
+              </a:rPr>
+              <a:t>…feat Pierre de FERMAT</a:t>
+            </a:r>
+          </a:p>
+        </p:txBody>
+      </p:sp>
+      <p:pic>
+        <p:nvPicPr>
+          <p:cNvPr id="13" name="Graphique 12">
+            <a:extLst>
+              <a:ext uri="{FF2B5EF4-FFF2-40B4-BE49-F238E27FC236}">
+                <a16:creationId xmlns:a16="http://schemas.microsoft.com/office/drawing/2014/main" id="{08CF0A00-338A-D3C2-4F51-17E6841F7D59}"/>
+              </a:ext>
+            </a:extLst>
+          </p:cNvPr>
+          <p:cNvPicPr>
+            <a:picLocks noChangeAspect="1"/>
+          </p:cNvPicPr>
+          <p:nvPr/>
+        </p:nvPicPr>
+        <p:blipFill>
+          <a:blip r:embed="rId5">
+            <a:extLst>
+              <a:ext uri="{28A0092B-C50C-407E-A947-70E740481C1C}">
+                <a14:useLocalDpi xmlns:a14="http://schemas.microsoft.com/office/drawing/2010/main" val="0"/>
+              </a:ext>
+              <a:ext uri="{96DAC541-7B7A-43D3-8B79-37D633B846F1}">
+                <asvg:svgBlip xmlns:asvg="http://schemas.microsoft.com/office/drawing/2016/SVG/main" r:embed="rId6"/>
+              </a:ext>
+            </a:extLst>
+          </a:blip>
+          <a:stretch>
+            <a:fillRect/>
+          </a:stretch>
+        </p:blipFill>
+        <p:spPr>
+          <a:xfrm>
+            <a:off x="4341585" y="1495273"/>
+            <a:ext cx="6629401" cy="4972049"/>
+          </a:xfrm>
+          <a:prstGeom prst="rect">
+            <a:avLst/>
+          </a:prstGeom>
+        </p:spPr>
+      </p:pic>
+      <p:pic>
+        <p:nvPicPr>
+          <p:cNvPr id="6" name="Graphique 16">
+            <a:extLst>
+              <a:ext uri="{FF2B5EF4-FFF2-40B4-BE49-F238E27FC236}">
+                <a16:creationId xmlns:a16="http://schemas.microsoft.com/office/drawing/2014/main" id="{C69E87FA-2872-188A-5DE1-A0DDE79FB073}"/>
+              </a:ext>
+            </a:extLst>
+          </p:cNvPr>
+          <p:cNvPicPr>
+            <a:picLocks noChangeAspect="1"/>
+          </p:cNvPicPr>
+          <p:nvPr/>
+        </p:nvPicPr>
+        <p:blipFill>
+          <a:blip r:embed="rId7">
+            <a:extLst>
+              <a:ext uri="{28A0092B-C50C-407E-A947-70E740481C1C}">
+                <a14:useLocalDpi xmlns:a14="http://schemas.microsoft.com/office/drawing/2010/main" val="0"/>
+              </a:ext>
+              <a:ext uri="{96DAC541-7B7A-43D3-8B79-37D633B846F1}">
+                <asvg:svgBlip xmlns:asvg="http://schemas.microsoft.com/office/drawing/2016/SVG/main" r:embed="rId8"/>
+              </a:ext>
+            </a:extLst>
+          </a:blip>
+          <a:srcRect/>
+          <a:stretch/>
+        </p:blipFill>
+        <p:spPr>
+          <a:xfrm rot="21301975">
+            <a:off x="1450975" y="2131065"/>
+            <a:ext cx="4702137" cy="4702137"/>
+          </a:xfrm>
+          <a:prstGeom prst="rect">
+            <a:avLst/>
+          </a:prstGeom>
+        </p:spPr>
+      </p:pic>
+    </p:spTree>
+    <p:extLst>
+      <p:ext uri="{BB962C8B-B14F-4D97-AF65-F5344CB8AC3E}">
+        <p14:creationId xmlns:p14="http://schemas.microsoft.com/office/powerpoint/2010/main" val="3130273401"/>
+      </p:ext>
+    </p:extLst>
+  </p:cSld>
+  <p:clrMapOvr>
+    <a:masterClrMapping/>
+  </p:clrMapOvr>
+  <p:timing>
+    <p:tnLst>
+      <p:par>
+        <p:cTn id="1" dur="indefinite" restart="never" nodeType="tmRoot">
+          <p:childTnLst>
+            <p:seq concurrent="1" nextAc="seek">
+              <p:cTn id="2" dur="indefinite" nodeType="mainSeq">
+                <p:childTnLst>
+                  <p:par>
+                    <p:cTn id="3" fill="hold">
+                      <p:stCondLst>
+                        <p:cond delay="indefinite"/>
+                      </p:stCondLst>
+                      <p:childTnLst>
+                        <p:par>
+                          <p:cTn id="4" fill="hold">
+                            <p:stCondLst>
+                              <p:cond delay="0"/>
+                            </p:stCondLst>
+                            <p:childTnLst>
+                              <p:par>
+                                <p:cTn id="5" presetID="10" presetClass="exit" presetSubtype="0" fill="hold" nodeType="clickEffect">
+                                  <p:stCondLst>
+                                    <p:cond delay="0"/>
+                                  </p:stCondLst>
+                                  <p:childTnLst>
+                                    <p:animEffect transition="out" filter="fade">
+                                      <p:cBhvr>
+                                        <p:cTn id="6" dur="500"/>
+                                        <p:tgtEl>
+                                          <p:spTgt spid="13"/>
+                                        </p:tgtEl>
+                                      </p:cBhvr>
+                                    </p:animEffect>
+                                    <p:set>
+                                      <p:cBhvr>
+                                        <p:cTn id="7" dur="1" fill="hold">
+                                          <p:stCondLst>
+                                            <p:cond delay="499"/>
+                                          </p:stCondLst>
+                                        </p:cTn>
+                                        <p:tgtEl>
+                                          <p:spTgt spid="13"/>
+                                        </p:tgtEl>
+                                        <p:attrNameLst>
+                                          <p:attrName>style.visibility</p:attrName>
+                                        </p:attrNameLst>
+                                      </p:cBhvr>
+                                      <p:to>
+                                        <p:strVal val="hidden"/>
+                                      </p:to>
+                                    </p:set>
+                                  </p:childTnLst>
+                                </p:cTn>
+                              </p:par>
+                              <p:par>
+                                <p:cTn id="8" presetID="10" presetClass="entr" presetSubtype="0" fill="hold" nodeType="withEffect">
+                                  <p:stCondLst>
+                                    <p:cond delay="250"/>
+                                  </p:stCondLst>
+                                  <p:childTnLst>
+                                    <p:set>
+                                      <p:cBhvr>
+                                        <p:cTn id="9" dur="1" fill="hold">
+                                          <p:stCondLst>
+                                            <p:cond delay="0"/>
+                                          </p:stCondLst>
+                                        </p:cTn>
+                                        <p:tgtEl>
+                                          <p:spTgt spid="6"/>
+                                        </p:tgtEl>
+                                        <p:attrNameLst>
+                                          <p:attrName>style.visibility</p:attrName>
+                                        </p:attrNameLst>
+                                      </p:cBhvr>
+                                      <p:to>
+                                        <p:strVal val="visible"/>
+                                      </p:to>
+                                    </p:set>
+                                    <p:animEffect transition="in" filter="fade">
+                                      <p:cBhvr>
+                                        <p:cTn id="10" dur="500"/>
+                                        <p:tgtEl>
+                                          <p:spTgt spid="6"/>
+                                        </p:tgtEl>
+                                      </p:cBhvr>
+                                    </p:animEffect>
+                                  </p:childTnLst>
+                                </p:cTn>
+                              </p:par>
+                            </p:childTnLst>
+                          </p:cTn>
+                        </p:par>
+                        <p:par>
+                          <p:cTn id="11" fill="hold">
+                            <p:stCondLst>
+                              <p:cond delay="750"/>
+                            </p:stCondLst>
+                            <p:childTnLst>
+                              <p:par>
+                                <p:cTn id="12" presetID="10" presetClass="entr" presetSubtype="0" fill="hold" grpId="0" nodeType="afterEffect">
+                                  <p:stCondLst>
+                                    <p:cond delay="500"/>
+                                  </p:stCondLst>
+                                  <p:childTnLst>
+                                    <p:set>
+                                      <p:cBhvr>
+                                        <p:cTn id="13" dur="1" fill="hold">
+                                          <p:stCondLst>
+                                            <p:cond delay="0"/>
+                                          </p:stCondLst>
+                                        </p:cTn>
+                                        <p:tgtEl>
+                                          <p:spTgt spid="5"/>
+                                        </p:tgtEl>
+                                        <p:attrNameLst>
+                                          <p:attrName>style.visibility</p:attrName>
+                                        </p:attrNameLst>
+                                      </p:cBhvr>
+                                      <p:to>
+                                        <p:strVal val="visible"/>
+                                      </p:to>
+                                    </p:set>
+                                    <p:animEffect transition="in" filter="fade">
+                                      <p:cBhvr>
+                                        <p:cTn id="14" dur="500"/>
+                                        <p:tgtEl>
+                                          <p:spTgt spid="5"/>
+                                        </p:tgtEl>
+                                      </p:cBhvr>
+                                    </p:animEffect>
+                                  </p:childTnLst>
+                                </p:cTn>
+                              </p:par>
+                            </p:childTnLst>
+                          </p:cTn>
+                        </p:par>
+                      </p:childTnLst>
+                    </p:cTn>
+                  </p:par>
+                </p:childTnLst>
+              </p:cTn>
+              <p:prevCondLst>
+                <p:cond evt="onPrev" delay="0">
+                  <p:tgtEl>
+                    <p:sldTgt/>
+                  </p:tgtEl>
+                </p:cond>
+              </p:prevCondLst>
+              <p:nextCondLst>
+                <p:cond evt="onNext" delay="0">
+                  <p:tgtEl>
+                    <p:sldTgt/>
+                  </p:tgtEl>
+                </p:cond>
+              </p:nextCondLst>
+            </p:seq>
+          </p:childTnLst>
+        </p:cTn>
+      </p:par>
+    </p:tnLst>
+    <p:bldLst>
+      <p:bldP spid="5" grpId="0"/>
     </p:bldLst>
   </p:timing>
 </p:sld>

</xml_diff>